<commit_message>
ppt de protopersona ataualizado
</commit_message>
<xml_diff>
--- a/Documentação/Sprint 1 - Entregavel do Projeto - v2 - Aluno (2) (1).pptx
+++ b/Documentação/Sprint 1 - Entregavel do Projeto - v2 - Aluno (2) (1).pptx
@@ -6,16 +6,20 @@
     <p:sldMasterId id="2147483665" r:id="rId5"/>
   </p:sldMasterIdLst>
   <p:notesMasterIdLst>
-    <p:notesMasterId r:id="rId10"/>
+    <p:notesMasterId r:id="rId14"/>
   </p:notesMasterIdLst>
   <p:handoutMasterIdLst>
-    <p:handoutMasterId r:id="rId11"/>
+    <p:handoutMasterId r:id="rId15"/>
   </p:handoutMasterIdLst>
   <p:sldIdLst>
-    <p:sldId id="632" r:id="rId6"/>
-    <p:sldId id="635" r:id="rId7"/>
-    <p:sldId id="634" r:id="rId8"/>
-    <p:sldId id="605" r:id="rId9"/>
+    <p:sldId id="638" r:id="rId6"/>
+    <p:sldId id="632" r:id="rId7"/>
+    <p:sldId id="636" r:id="rId8"/>
+    <p:sldId id="635" r:id="rId9"/>
+    <p:sldId id="634" r:id="rId10"/>
+    <p:sldId id="637" r:id="rId11"/>
+    <p:sldId id="605" r:id="rId12"/>
+    <p:sldId id="639" r:id="rId13"/>
   </p:sldIdLst>
   <p:sldSz cx="13442950" cy="7561263"/>
   <p:notesSz cx="6858000" cy="9144000"/>
@@ -230,7 +234,7 @@
             <a:fld id="{C3CD65D1-5C11-455D-9F9A-0E035F00A0DA}" type="datetimeFigureOut">
               <a:rPr lang="pt-BR" smtClean="0"/>
               <a:pPr/>
-              <a:t>24/08/2021</a:t>
+              <a:t>01/09/2021</a:t>
             </a:fld>
             <a:endParaRPr lang="pt-BR"/>
           </a:p>
@@ -297,7 +301,7 @@
             <a:fld id="{CA8E3B7C-E4AE-4E9E-8479-7C668141D483}" type="slidenum">
               <a:rPr lang="pt-BR" smtClean="0"/>
               <a:pPr/>
-              <a:t>‹#›</a:t>
+              <a:t>‹nº›</a:t>
             </a:fld>
             <a:endParaRPr lang="pt-BR"/>
           </a:p>
@@ -398,7 +402,7 @@
             <a:fld id="{A05DA3EF-18EA-43DE-B1BB-402A3C558822}" type="datetimeFigureOut">
               <a:rPr lang="pt-BR" smtClean="0"/>
               <a:pPr/>
-              <a:t>24/08/2021</a:t>
+              <a:t>01/09/2021</a:t>
             </a:fld>
             <a:endParaRPr lang="pt-BR"/>
           </a:p>
@@ -559,7 +563,7 @@
             <a:fld id="{75B3645A-D0AE-4F6E-A17E-E0036A9041AF}" type="slidenum">
               <a:rPr lang="pt-BR" smtClean="0"/>
               <a:pPr/>
-              <a:t>‹#›</a:t>
+              <a:t>‹nº›</a:t>
             </a:fld>
             <a:endParaRPr lang="pt-BR"/>
           </a:p>
@@ -1111,7 +1115,7 @@
               <a:pPr>
                 <a:defRPr/>
               </a:pPr>
-              <a:t>‹#›</a:t>
+              <a:t>‹nº›</a:t>
             </a:fld>
             <a:endParaRPr lang="pt-BR" sz="880"/>
           </a:p>
@@ -2470,7 +2474,7 @@
               <a:pPr>
                 <a:defRPr/>
               </a:pPr>
-              <a:t>‹#›</a:t>
+              <a:t>‹nº›</a:t>
             </a:fld>
             <a:endParaRPr lang="pt-BR" sz="880"/>
           </a:p>
@@ -7699,6 +7703,818 @@
       </p:grpSpPr>
       <p:sp>
         <p:nvSpPr>
+          <p:cNvPr id="9" name="Espaço Reservado para Texto 1">
+            <a:extLst>
+              <a:ext uri="{FF2B5EF4-FFF2-40B4-BE49-F238E27FC236}">
+                <a16:creationId xmlns:a16="http://schemas.microsoft.com/office/drawing/2014/main" id="{BF0257EA-7615-4472-801D-5FCD54572EAC}"/>
+              </a:ext>
+            </a:extLst>
+          </p:cNvPr>
+          <p:cNvSpPr txBox="1">
+            <a:spLocks/>
+          </p:cNvSpPr>
+          <p:nvPr/>
+        </p:nvSpPr>
+        <p:spPr>
+          <a:xfrm>
+            <a:off x="610094" y="1278570"/>
+            <a:ext cx="12448085" cy="5376229"/>
+          </a:xfrm>
+          <a:prstGeom prst="rect">
+            <a:avLst/>
+          </a:prstGeom>
+        </p:spPr>
+        <p:txBody>
+          <a:bodyPr/>
+          <a:lstStyle>
+            <a:lvl1pPr marL="431080" indent="-431080" algn="l" defTabSz="1149545" rtl="0" eaLnBrk="1" latinLnBrk="0" hangingPunct="1">
+              <a:spcBef>
+                <a:spcPct val="20000"/>
+              </a:spcBef>
+              <a:buFont typeface="Arial" pitchFamily="34" charset="0"/>
+              <a:buChar char="•"/>
+              <a:defRPr sz="4023" kern="1200">
+                <a:solidFill>
+                  <a:schemeClr val="tx1"/>
+                </a:solidFill>
+                <a:latin typeface="+mn-lt"/>
+                <a:ea typeface="+mn-ea"/>
+                <a:cs typeface="+mn-cs"/>
+              </a:defRPr>
+            </a:lvl1pPr>
+            <a:lvl2pPr marL="934005" indent="-359233" algn="l" defTabSz="1149545" rtl="0" eaLnBrk="1" latinLnBrk="0" hangingPunct="1">
+              <a:spcBef>
+                <a:spcPct val="20000"/>
+              </a:spcBef>
+              <a:buFont typeface="Arial" pitchFamily="34" charset="0"/>
+              <a:buChar char="–"/>
+              <a:defRPr sz="3520" kern="1200">
+                <a:solidFill>
+                  <a:schemeClr val="tx1"/>
+                </a:solidFill>
+                <a:latin typeface="+mn-lt"/>
+                <a:ea typeface="+mn-ea"/>
+                <a:cs typeface="+mn-cs"/>
+              </a:defRPr>
+            </a:lvl2pPr>
+            <a:lvl3pPr marL="1436931" indent="-287386" algn="l" defTabSz="1149545" rtl="0" eaLnBrk="1" latinLnBrk="0" hangingPunct="1">
+              <a:spcBef>
+                <a:spcPct val="20000"/>
+              </a:spcBef>
+              <a:buFont typeface="Arial" pitchFamily="34" charset="0"/>
+              <a:buChar char="•"/>
+              <a:defRPr sz="3017" kern="1200">
+                <a:solidFill>
+                  <a:schemeClr val="tx1"/>
+                </a:solidFill>
+                <a:latin typeface="+mn-lt"/>
+                <a:ea typeface="+mn-ea"/>
+                <a:cs typeface="+mn-cs"/>
+              </a:defRPr>
+            </a:lvl3pPr>
+            <a:lvl4pPr marL="2011704" indent="-287386" algn="l" defTabSz="1149545" rtl="0" eaLnBrk="1" latinLnBrk="0" hangingPunct="1">
+              <a:spcBef>
+                <a:spcPct val="20000"/>
+              </a:spcBef>
+              <a:buFont typeface="Arial" pitchFamily="34" charset="0"/>
+              <a:buChar char="–"/>
+              <a:defRPr sz="2514" kern="1200">
+                <a:solidFill>
+                  <a:schemeClr val="tx1"/>
+                </a:solidFill>
+                <a:latin typeface="+mn-lt"/>
+                <a:ea typeface="+mn-ea"/>
+                <a:cs typeface="+mn-cs"/>
+              </a:defRPr>
+            </a:lvl4pPr>
+            <a:lvl5pPr marL="2586478" indent="-287386" algn="l" defTabSz="1149545" rtl="0" eaLnBrk="1" latinLnBrk="0" hangingPunct="1">
+              <a:spcBef>
+                <a:spcPct val="20000"/>
+              </a:spcBef>
+              <a:buFont typeface="Arial" pitchFamily="34" charset="0"/>
+              <a:buChar char="»"/>
+              <a:defRPr sz="2514" kern="1200">
+                <a:solidFill>
+                  <a:schemeClr val="tx1"/>
+                </a:solidFill>
+                <a:latin typeface="+mn-lt"/>
+                <a:ea typeface="+mn-ea"/>
+                <a:cs typeface="+mn-cs"/>
+              </a:defRPr>
+            </a:lvl5pPr>
+            <a:lvl6pPr marL="3161249" indent="-287386" algn="l" defTabSz="1149545" rtl="0" eaLnBrk="1" latinLnBrk="0" hangingPunct="1">
+              <a:spcBef>
+                <a:spcPct val="20000"/>
+              </a:spcBef>
+              <a:buFont typeface="Arial" pitchFamily="34" charset="0"/>
+              <a:buChar char="•"/>
+              <a:defRPr sz="2514" kern="1200">
+                <a:solidFill>
+                  <a:schemeClr val="tx1"/>
+                </a:solidFill>
+                <a:latin typeface="+mn-lt"/>
+                <a:ea typeface="+mn-ea"/>
+                <a:cs typeface="+mn-cs"/>
+              </a:defRPr>
+            </a:lvl6pPr>
+            <a:lvl7pPr marL="3736023" indent="-287386" algn="l" defTabSz="1149545" rtl="0" eaLnBrk="1" latinLnBrk="0" hangingPunct="1">
+              <a:spcBef>
+                <a:spcPct val="20000"/>
+              </a:spcBef>
+              <a:buFont typeface="Arial" pitchFamily="34" charset="0"/>
+              <a:buChar char="•"/>
+              <a:defRPr sz="2514" kern="1200">
+                <a:solidFill>
+                  <a:schemeClr val="tx1"/>
+                </a:solidFill>
+                <a:latin typeface="+mn-lt"/>
+                <a:ea typeface="+mn-ea"/>
+                <a:cs typeface="+mn-cs"/>
+              </a:defRPr>
+            </a:lvl7pPr>
+            <a:lvl8pPr marL="4310795" indent="-287386" algn="l" defTabSz="1149545" rtl="0" eaLnBrk="1" latinLnBrk="0" hangingPunct="1">
+              <a:spcBef>
+                <a:spcPct val="20000"/>
+              </a:spcBef>
+              <a:buFont typeface="Arial" pitchFamily="34" charset="0"/>
+              <a:buChar char="•"/>
+              <a:defRPr sz="2514" kern="1200">
+                <a:solidFill>
+                  <a:schemeClr val="tx1"/>
+                </a:solidFill>
+                <a:latin typeface="+mn-lt"/>
+                <a:ea typeface="+mn-ea"/>
+                <a:cs typeface="+mn-cs"/>
+              </a:defRPr>
+            </a:lvl8pPr>
+            <a:lvl9pPr marL="4885567" indent="-287386" algn="l" defTabSz="1149545" rtl="0" eaLnBrk="1" latinLnBrk="0" hangingPunct="1">
+              <a:spcBef>
+                <a:spcPct val="20000"/>
+              </a:spcBef>
+              <a:buFont typeface="Arial" pitchFamily="34" charset="0"/>
+              <a:buChar char="•"/>
+              <a:defRPr sz="2514" kern="1200">
+                <a:solidFill>
+                  <a:schemeClr val="tx1"/>
+                </a:solidFill>
+                <a:latin typeface="+mn-lt"/>
+                <a:ea typeface="+mn-ea"/>
+                <a:cs typeface="+mn-cs"/>
+              </a:defRPr>
+            </a:lvl9pPr>
+          </a:lstStyle>
+          <a:p>
+            <a:r>
+              <a:rPr lang="pt-BR" dirty="0"/>
+              <a:t>Qual o negócio (área) do projeto?</a:t>
+            </a:r>
+          </a:p>
+          <a:p>
+            <a:pPr marL="0" indent="0">
+              <a:buFont typeface="Arial" pitchFamily="34" charset="0"/>
+              <a:buNone/>
+            </a:pPr>
+            <a:r>
+              <a:rPr lang="pt-BR" dirty="0"/>
+              <a:t>R: Vamos criar uma aplicação para localizar e alugar quadras de basquete e futebol</a:t>
+            </a:r>
+          </a:p>
+          <a:p>
+            <a:pPr marL="0" indent="0">
+              <a:buFont typeface="Arial" pitchFamily="34" charset="0"/>
+              <a:buNone/>
+            </a:pPr>
+            <a:endParaRPr lang="pt-BR" dirty="0"/>
+          </a:p>
+          <a:p>
+            <a:pPr marL="0" indent="0">
+              <a:buFont typeface="Arial" pitchFamily="34" charset="0"/>
+              <a:buNone/>
+            </a:pPr>
+            <a:r>
+              <a:rPr lang="pt-BR" sz="3600" dirty="0"/>
+              <a:t>Visitamos um app semelhante ao nosso de nome </a:t>
+            </a:r>
+            <a:r>
+              <a:rPr lang="pt-BR" sz="3600" dirty="0" err="1"/>
+              <a:t>Apitto</a:t>
+            </a:r>
+            <a:r>
+              <a:rPr lang="pt-BR" sz="3600" dirty="0"/>
+              <a:t>, pegamos algumas características e vamos por no nosso site</a:t>
+            </a:r>
+          </a:p>
+          <a:p>
+            <a:endParaRPr lang="pt-BR" sz="2400" dirty="0">
+              <a:solidFill>
+                <a:srgbClr val="253746"/>
+              </a:solidFill>
+            </a:endParaRPr>
+          </a:p>
+          <a:p>
+            <a:endParaRPr lang="pt-BR" sz="2400" dirty="0">
+              <a:solidFill>
+                <a:srgbClr val="253746"/>
+              </a:solidFill>
+            </a:endParaRPr>
+          </a:p>
+          <a:p>
+            <a:endParaRPr lang="pt-BR" sz="2400" dirty="0">
+              <a:solidFill>
+                <a:srgbClr val="253746"/>
+              </a:solidFill>
+            </a:endParaRPr>
+          </a:p>
+          <a:p>
+            <a:pPr marL="0" indent="0">
+              <a:buFont typeface="Arial" pitchFamily="34" charset="0"/>
+              <a:buNone/>
+            </a:pPr>
+            <a:endParaRPr lang="pt-BR" sz="2400" dirty="0">
+              <a:solidFill>
+                <a:srgbClr val="253746"/>
+              </a:solidFill>
+            </a:endParaRPr>
+          </a:p>
+          <a:p>
+            <a:endParaRPr lang="pt-BR" sz="2400" dirty="0">
+              <a:solidFill>
+                <a:srgbClr val="253746"/>
+              </a:solidFill>
+            </a:endParaRPr>
+          </a:p>
+          <a:p>
+            <a:endParaRPr lang="pt-BR" sz="2400" dirty="0">
+              <a:solidFill>
+                <a:srgbClr val="253746"/>
+              </a:solidFill>
+            </a:endParaRPr>
+          </a:p>
+          <a:p>
+            <a:endParaRPr lang="pt-BR" dirty="0"/>
+          </a:p>
+        </p:txBody>
+      </p:sp>
+      <p:sp>
+        <p:nvSpPr>
+          <p:cNvPr id="10" name="Espaço Reservado para Número de Slide 2">
+            <a:extLst>
+              <a:ext uri="{FF2B5EF4-FFF2-40B4-BE49-F238E27FC236}">
+                <a16:creationId xmlns:a16="http://schemas.microsoft.com/office/drawing/2014/main" id="{F24F6375-39BA-4ECB-B6E6-A592B9E64E58}"/>
+              </a:ext>
+            </a:extLst>
+          </p:cNvPr>
+          <p:cNvSpPr txBox="1">
+            <a:spLocks/>
+          </p:cNvSpPr>
+          <p:nvPr/>
+        </p:nvSpPr>
+        <p:spPr>
+          <a:xfrm>
+            <a:off x="12605478" y="7237015"/>
+            <a:ext cx="628646" cy="214290"/>
+          </a:xfrm>
+          <a:prstGeom prst="rect">
+            <a:avLst/>
+          </a:prstGeom>
+        </p:spPr>
+        <p:txBody>
+          <a:bodyPr/>
+          <a:lstStyle>
+            <a:lvl1pPr marL="431080" indent="-431080" algn="l" defTabSz="1149545" rtl="0" eaLnBrk="1" latinLnBrk="0" hangingPunct="1">
+              <a:spcBef>
+                <a:spcPct val="20000"/>
+              </a:spcBef>
+              <a:buFont typeface="Arial" pitchFamily="34" charset="0"/>
+              <a:buChar char="•"/>
+              <a:defRPr sz="3394" kern="1200">
+                <a:solidFill>
+                  <a:schemeClr val="tx1"/>
+                </a:solidFill>
+                <a:latin typeface="Exo 2" pitchFamily="50" charset="0"/>
+                <a:ea typeface="+mn-ea"/>
+                <a:cs typeface="+mn-cs"/>
+              </a:defRPr>
+            </a:lvl1pPr>
+            <a:lvl2pPr marL="934005" indent="-359233" algn="l" defTabSz="1149545" rtl="0" eaLnBrk="1" latinLnBrk="0" hangingPunct="1">
+              <a:spcBef>
+                <a:spcPct val="20000"/>
+              </a:spcBef>
+              <a:buFont typeface="Arial" pitchFamily="34" charset="0"/>
+              <a:buChar char="–"/>
+              <a:defRPr sz="2891" kern="1200">
+                <a:solidFill>
+                  <a:schemeClr val="tx1"/>
+                </a:solidFill>
+                <a:latin typeface="Exo 2" pitchFamily="50" charset="0"/>
+                <a:ea typeface="+mn-ea"/>
+                <a:cs typeface="+mn-cs"/>
+              </a:defRPr>
+            </a:lvl2pPr>
+            <a:lvl3pPr marL="1436931" indent="-287386" algn="l" defTabSz="1149545" rtl="0" eaLnBrk="1" latinLnBrk="0" hangingPunct="1">
+              <a:spcBef>
+                <a:spcPct val="20000"/>
+              </a:spcBef>
+              <a:buFont typeface="Arial" pitchFamily="34" charset="0"/>
+              <a:buChar char="•"/>
+              <a:defRPr sz="2640" kern="1200">
+                <a:solidFill>
+                  <a:schemeClr val="tx1"/>
+                </a:solidFill>
+                <a:latin typeface="Exo 2" pitchFamily="50" charset="0"/>
+                <a:ea typeface="+mn-ea"/>
+                <a:cs typeface="+mn-cs"/>
+              </a:defRPr>
+            </a:lvl3pPr>
+            <a:lvl4pPr marL="2011704" indent="-287386" algn="l" defTabSz="1149545" rtl="0" eaLnBrk="1" latinLnBrk="0" hangingPunct="1">
+              <a:spcBef>
+                <a:spcPct val="20000"/>
+              </a:spcBef>
+              <a:buFont typeface="Arial" pitchFamily="34" charset="0"/>
+              <a:buChar char="–"/>
+              <a:defRPr sz="2263" kern="1200">
+                <a:solidFill>
+                  <a:schemeClr val="tx1"/>
+                </a:solidFill>
+                <a:latin typeface="Exo 2" pitchFamily="50" charset="0"/>
+                <a:ea typeface="+mn-ea"/>
+                <a:cs typeface="+mn-cs"/>
+              </a:defRPr>
+            </a:lvl4pPr>
+            <a:lvl5pPr marL="2586478" indent="-287386" algn="l" defTabSz="1149545" rtl="0" eaLnBrk="1" latinLnBrk="0" hangingPunct="1">
+              <a:spcBef>
+                <a:spcPct val="20000"/>
+              </a:spcBef>
+              <a:buFont typeface="Arial" pitchFamily="34" charset="0"/>
+              <a:buChar char="»"/>
+              <a:defRPr sz="2263" kern="1200">
+                <a:solidFill>
+                  <a:schemeClr val="tx1"/>
+                </a:solidFill>
+                <a:latin typeface="Exo 2" pitchFamily="50" charset="0"/>
+                <a:ea typeface="+mn-ea"/>
+                <a:cs typeface="+mn-cs"/>
+              </a:defRPr>
+            </a:lvl5pPr>
+            <a:lvl6pPr marL="3161249" indent="-287386" algn="l" defTabSz="1149545" rtl="0" eaLnBrk="1" latinLnBrk="0" hangingPunct="1">
+              <a:spcBef>
+                <a:spcPct val="20000"/>
+              </a:spcBef>
+              <a:buFont typeface="Arial" pitchFamily="34" charset="0"/>
+              <a:buChar char="•"/>
+              <a:defRPr sz="2263" kern="1200">
+                <a:solidFill>
+                  <a:schemeClr val="tx1"/>
+                </a:solidFill>
+                <a:latin typeface="+mn-lt"/>
+                <a:ea typeface="+mn-ea"/>
+                <a:cs typeface="+mn-cs"/>
+              </a:defRPr>
+            </a:lvl6pPr>
+            <a:lvl7pPr marL="3736023" indent="-287386" algn="l" defTabSz="1149545" rtl="0" eaLnBrk="1" latinLnBrk="0" hangingPunct="1">
+              <a:spcBef>
+                <a:spcPct val="20000"/>
+              </a:spcBef>
+              <a:buFont typeface="Arial" pitchFamily="34" charset="0"/>
+              <a:buChar char="•"/>
+              <a:defRPr sz="2263" kern="1200">
+                <a:solidFill>
+                  <a:schemeClr val="tx1"/>
+                </a:solidFill>
+                <a:latin typeface="+mn-lt"/>
+                <a:ea typeface="+mn-ea"/>
+                <a:cs typeface="+mn-cs"/>
+              </a:defRPr>
+            </a:lvl7pPr>
+            <a:lvl8pPr marL="4310795" indent="-287386" algn="l" defTabSz="1149545" rtl="0" eaLnBrk="1" latinLnBrk="0" hangingPunct="1">
+              <a:spcBef>
+                <a:spcPct val="20000"/>
+              </a:spcBef>
+              <a:buFont typeface="Arial" pitchFamily="34" charset="0"/>
+              <a:buChar char="•"/>
+              <a:defRPr sz="2263" kern="1200">
+                <a:solidFill>
+                  <a:schemeClr val="tx1"/>
+                </a:solidFill>
+                <a:latin typeface="+mn-lt"/>
+                <a:ea typeface="+mn-ea"/>
+                <a:cs typeface="+mn-cs"/>
+              </a:defRPr>
+            </a:lvl8pPr>
+            <a:lvl9pPr marL="4885567" indent="-287386" algn="l" defTabSz="1149545" rtl="0" eaLnBrk="1" latinLnBrk="0" hangingPunct="1">
+              <a:spcBef>
+                <a:spcPct val="20000"/>
+              </a:spcBef>
+              <a:buFont typeface="Arial" pitchFamily="34" charset="0"/>
+              <a:buChar char="•"/>
+              <a:defRPr sz="2263" kern="1200">
+                <a:solidFill>
+                  <a:schemeClr val="tx1"/>
+                </a:solidFill>
+                <a:latin typeface="+mn-lt"/>
+                <a:ea typeface="+mn-ea"/>
+                <a:cs typeface="+mn-cs"/>
+              </a:defRPr>
+            </a:lvl9pPr>
+          </a:lstStyle>
+          <a:p>
+            <a:pPr>
+              <a:defRPr/>
+            </a:pPr>
+            <a:fld id="{B66251D2-9488-44CD-87B4-F793A73C4A01}" type="slidenum">
+              <a:rPr lang="pt-BR" smtClean="0"/>
+              <a:pPr>
+                <a:defRPr/>
+              </a:pPr>
+              <a:t>1</a:t>
+            </a:fld>
+            <a:endParaRPr lang="pt-BR" sz="880" dirty="0"/>
+          </a:p>
+        </p:txBody>
+      </p:sp>
+      <p:sp>
+        <p:nvSpPr>
+          <p:cNvPr id="11" name="Espaço Reservado para Texto 3">
+            <a:extLst>
+              <a:ext uri="{FF2B5EF4-FFF2-40B4-BE49-F238E27FC236}">
+                <a16:creationId xmlns:a16="http://schemas.microsoft.com/office/drawing/2014/main" id="{FD3539A0-1C85-4272-B95F-D0EBB8E65A13}"/>
+              </a:ext>
+            </a:extLst>
+          </p:cNvPr>
+          <p:cNvSpPr txBox="1">
+            <a:spLocks/>
+          </p:cNvSpPr>
+          <p:nvPr/>
+        </p:nvSpPr>
+        <p:spPr>
+          <a:xfrm>
+            <a:off x="2184972" y="108228"/>
+            <a:ext cx="10782599" cy="765639"/>
+          </a:xfrm>
+          <a:prstGeom prst="rect">
+            <a:avLst/>
+          </a:prstGeom>
+        </p:spPr>
+        <p:txBody>
+          <a:bodyPr anchor="t"/>
+          <a:lstStyle>
+            <a:lvl1pPr marL="431080" indent="-431080" algn="l" defTabSz="1149545" rtl="0" eaLnBrk="1" latinLnBrk="0" hangingPunct="1">
+              <a:spcBef>
+                <a:spcPct val="20000"/>
+              </a:spcBef>
+              <a:buFont typeface="Arial" pitchFamily="34" charset="0"/>
+              <a:buNone/>
+              <a:defRPr sz="3771" b="1" kern="1200" baseline="0">
+                <a:solidFill>
+                  <a:srgbClr val="32B9CD"/>
+                </a:solidFill>
+                <a:latin typeface="Exo 2" pitchFamily="50" charset="0"/>
+                <a:ea typeface="+mn-ea"/>
+                <a:cs typeface="+mn-cs"/>
+              </a:defRPr>
+            </a:lvl1pPr>
+            <a:lvl2pPr marL="934005" indent="-359233" algn="l" defTabSz="1149545" rtl="0" eaLnBrk="1" latinLnBrk="0" hangingPunct="1">
+              <a:spcBef>
+                <a:spcPct val="20000"/>
+              </a:spcBef>
+              <a:buFont typeface="Arial" pitchFamily="34" charset="0"/>
+              <a:buNone/>
+              <a:defRPr sz="3771" kern="1200">
+                <a:solidFill>
+                  <a:schemeClr val="tx1"/>
+                </a:solidFill>
+                <a:latin typeface="Exo 2" pitchFamily="50" charset="0"/>
+                <a:ea typeface="+mn-ea"/>
+                <a:cs typeface="+mn-cs"/>
+              </a:defRPr>
+            </a:lvl2pPr>
+            <a:lvl3pPr marL="1436931" indent="-287386" algn="l" defTabSz="1149545" rtl="0" eaLnBrk="1" latinLnBrk="0" hangingPunct="1">
+              <a:spcBef>
+                <a:spcPct val="20000"/>
+              </a:spcBef>
+              <a:buFont typeface="Arial" pitchFamily="34" charset="0"/>
+              <a:buNone/>
+              <a:defRPr sz="3771" kern="1200">
+                <a:solidFill>
+                  <a:schemeClr val="tx1"/>
+                </a:solidFill>
+                <a:latin typeface="Exo 2" pitchFamily="50" charset="0"/>
+                <a:ea typeface="+mn-ea"/>
+                <a:cs typeface="+mn-cs"/>
+              </a:defRPr>
+            </a:lvl3pPr>
+            <a:lvl4pPr marL="2011704" indent="-287386" algn="l" defTabSz="1149545" rtl="0" eaLnBrk="1" latinLnBrk="0" hangingPunct="1">
+              <a:spcBef>
+                <a:spcPct val="20000"/>
+              </a:spcBef>
+              <a:buFont typeface="Arial" pitchFamily="34" charset="0"/>
+              <a:buNone/>
+              <a:defRPr sz="3771" kern="1200">
+                <a:solidFill>
+                  <a:schemeClr val="tx1"/>
+                </a:solidFill>
+                <a:latin typeface="Exo 2" pitchFamily="50" charset="0"/>
+                <a:ea typeface="+mn-ea"/>
+                <a:cs typeface="+mn-cs"/>
+              </a:defRPr>
+            </a:lvl4pPr>
+            <a:lvl5pPr marL="2586478" indent="-287386" algn="l" defTabSz="1149545" rtl="0" eaLnBrk="1" latinLnBrk="0" hangingPunct="1">
+              <a:spcBef>
+                <a:spcPct val="20000"/>
+              </a:spcBef>
+              <a:buFont typeface="Arial" pitchFamily="34" charset="0"/>
+              <a:buNone/>
+              <a:defRPr sz="3771" kern="1200">
+                <a:solidFill>
+                  <a:schemeClr val="tx1"/>
+                </a:solidFill>
+                <a:latin typeface="Exo 2" pitchFamily="50" charset="0"/>
+                <a:ea typeface="+mn-ea"/>
+                <a:cs typeface="+mn-cs"/>
+              </a:defRPr>
+            </a:lvl5pPr>
+            <a:lvl6pPr marL="3161249" indent="-287386" algn="l" defTabSz="1149545" rtl="0" eaLnBrk="1" latinLnBrk="0" hangingPunct="1">
+              <a:spcBef>
+                <a:spcPct val="20000"/>
+              </a:spcBef>
+              <a:buFont typeface="Arial" pitchFamily="34" charset="0"/>
+              <a:buChar char="•"/>
+              <a:defRPr sz="2514" kern="1200">
+                <a:solidFill>
+                  <a:schemeClr val="tx1"/>
+                </a:solidFill>
+                <a:latin typeface="+mn-lt"/>
+                <a:ea typeface="+mn-ea"/>
+                <a:cs typeface="+mn-cs"/>
+              </a:defRPr>
+            </a:lvl6pPr>
+            <a:lvl7pPr marL="3736023" indent="-287386" algn="l" defTabSz="1149545" rtl="0" eaLnBrk="1" latinLnBrk="0" hangingPunct="1">
+              <a:spcBef>
+                <a:spcPct val="20000"/>
+              </a:spcBef>
+              <a:buFont typeface="Arial" pitchFamily="34" charset="0"/>
+              <a:buChar char="•"/>
+              <a:defRPr sz="2514" kern="1200">
+                <a:solidFill>
+                  <a:schemeClr val="tx1"/>
+                </a:solidFill>
+                <a:latin typeface="+mn-lt"/>
+                <a:ea typeface="+mn-ea"/>
+                <a:cs typeface="+mn-cs"/>
+              </a:defRPr>
+            </a:lvl7pPr>
+            <a:lvl8pPr marL="4310795" indent="-287386" algn="l" defTabSz="1149545" rtl="0" eaLnBrk="1" latinLnBrk="0" hangingPunct="1">
+              <a:spcBef>
+                <a:spcPct val="20000"/>
+              </a:spcBef>
+              <a:buFont typeface="Arial" pitchFamily="34" charset="0"/>
+              <a:buChar char="•"/>
+              <a:defRPr sz="2514" kern="1200">
+                <a:solidFill>
+                  <a:schemeClr val="tx1"/>
+                </a:solidFill>
+                <a:latin typeface="+mn-lt"/>
+                <a:ea typeface="+mn-ea"/>
+                <a:cs typeface="+mn-cs"/>
+              </a:defRPr>
+            </a:lvl8pPr>
+            <a:lvl9pPr marL="4885567" indent="-287386" algn="l" defTabSz="1149545" rtl="0" eaLnBrk="1" latinLnBrk="0" hangingPunct="1">
+              <a:spcBef>
+                <a:spcPct val="20000"/>
+              </a:spcBef>
+              <a:buFont typeface="Arial" pitchFamily="34" charset="0"/>
+              <a:buChar char="•"/>
+              <a:defRPr sz="2514" kern="1200">
+                <a:solidFill>
+                  <a:schemeClr val="tx1"/>
+                </a:solidFill>
+                <a:latin typeface="+mn-lt"/>
+                <a:ea typeface="+mn-ea"/>
+                <a:cs typeface="+mn-cs"/>
+              </a:defRPr>
+            </a:lvl9pPr>
+          </a:lstStyle>
+          <a:p>
+            <a:r>
+              <a:rPr lang="pt-BR"/>
+              <a:t>1. Negócio</a:t>
+            </a:r>
+            <a:endParaRPr lang="pt-BR" dirty="0"/>
+          </a:p>
+        </p:txBody>
+      </p:sp>
+    </p:spTree>
+    <p:extLst>
+      <p:ext uri="{BB962C8B-B14F-4D97-AF65-F5344CB8AC3E}">
+        <p14:creationId xmlns:p14="http://schemas.microsoft.com/office/powerpoint/2010/main" val="2801855402"/>
+      </p:ext>
+    </p:extLst>
+  </p:cSld>
+  <p:clrMapOvr>
+    <a:masterClrMapping/>
+  </p:clrMapOvr>
+  <p:timing>
+    <p:tnLst>
+      <p:par>
+        <p:cTn id="1" dur="indefinite" restart="never" nodeType="tmRoot">
+          <p:childTnLst>
+            <p:seq concurrent="1" nextAc="seek">
+              <p:cTn id="2" dur="indefinite" nodeType="mainSeq">
+                <p:childTnLst>
+                  <p:par>
+                    <p:cTn id="3" fill="hold">
+                      <p:stCondLst>
+                        <p:cond delay="indefinite"/>
+                      </p:stCondLst>
+                      <p:childTnLst>
+                        <p:par>
+                          <p:cTn id="4" fill="hold">
+                            <p:stCondLst>
+                              <p:cond delay="0"/>
+                            </p:stCondLst>
+                            <p:childTnLst>
+                              <p:par>
+                                <p:cTn id="5" presetID="1" presetClass="entr" presetSubtype="0" fill="hold" grpId="0" nodeType="clickEffect">
+                                  <p:stCondLst>
+                                    <p:cond delay="0"/>
+                                  </p:stCondLst>
+                                  <p:childTnLst>
+                                    <p:set>
+                                      <p:cBhvr>
+                                        <p:cTn id="6" dur="1" fill="hold">
+                                          <p:stCondLst>
+                                            <p:cond delay="0"/>
+                                          </p:stCondLst>
+                                        </p:cTn>
+                                        <p:tgtEl>
+                                          <p:spTgt spid="9">
+                                            <p:txEl>
+                                              <p:pRg st="0" end="0"/>
+                                            </p:txEl>
+                                          </p:spTgt>
+                                        </p:tgtEl>
+                                        <p:attrNameLst>
+                                          <p:attrName>style.visibility</p:attrName>
+                                        </p:attrNameLst>
+                                      </p:cBhvr>
+                                      <p:to>
+                                        <p:strVal val="visible"/>
+                                      </p:to>
+                                    </p:set>
+                                  </p:childTnLst>
+                                </p:cTn>
+                              </p:par>
+                            </p:childTnLst>
+                          </p:cTn>
+                        </p:par>
+                      </p:childTnLst>
+                    </p:cTn>
+                  </p:par>
+                  <p:par>
+                    <p:cTn id="7" fill="hold">
+                      <p:stCondLst>
+                        <p:cond delay="indefinite"/>
+                      </p:stCondLst>
+                      <p:childTnLst>
+                        <p:par>
+                          <p:cTn id="8" fill="hold">
+                            <p:stCondLst>
+                              <p:cond delay="0"/>
+                            </p:stCondLst>
+                            <p:childTnLst>
+                              <p:par>
+                                <p:cTn id="9" presetID="1" presetClass="entr" presetSubtype="0" fill="hold" grpId="0" nodeType="clickEffect">
+                                  <p:stCondLst>
+                                    <p:cond delay="0"/>
+                                  </p:stCondLst>
+                                  <p:childTnLst>
+                                    <p:set>
+                                      <p:cBhvr>
+                                        <p:cTn id="10" dur="1" fill="hold">
+                                          <p:stCondLst>
+                                            <p:cond delay="0"/>
+                                          </p:stCondLst>
+                                        </p:cTn>
+                                        <p:tgtEl>
+                                          <p:spTgt spid="9">
+                                            <p:txEl>
+                                              <p:pRg st="1" end="1"/>
+                                            </p:txEl>
+                                          </p:spTgt>
+                                        </p:tgtEl>
+                                        <p:attrNameLst>
+                                          <p:attrName>style.visibility</p:attrName>
+                                        </p:attrNameLst>
+                                      </p:cBhvr>
+                                      <p:to>
+                                        <p:strVal val="visible"/>
+                                      </p:to>
+                                    </p:set>
+                                  </p:childTnLst>
+                                </p:cTn>
+                              </p:par>
+                            </p:childTnLst>
+                          </p:cTn>
+                        </p:par>
+                      </p:childTnLst>
+                    </p:cTn>
+                  </p:par>
+                  <p:par>
+                    <p:cTn id="11" fill="hold">
+                      <p:stCondLst>
+                        <p:cond delay="indefinite"/>
+                      </p:stCondLst>
+                      <p:childTnLst>
+                        <p:par>
+                          <p:cTn id="12" fill="hold">
+                            <p:stCondLst>
+                              <p:cond delay="0"/>
+                            </p:stCondLst>
+                            <p:childTnLst>
+                              <p:par>
+                                <p:cTn id="13" presetID="1" presetClass="entr" presetSubtype="0" fill="hold" grpId="0" nodeType="clickEffect">
+                                  <p:stCondLst>
+                                    <p:cond delay="0"/>
+                                  </p:stCondLst>
+                                  <p:childTnLst>
+                                    <p:set>
+                                      <p:cBhvr>
+                                        <p:cTn id="14" dur="1" fill="hold">
+                                          <p:stCondLst>
+                                            <p:cond delay="0"/>
+                                          </p:stCondLst>
+                                        </p:cTn>
+                                        <p:tgtEl>
+                                          <p:spTgt spid="9">
+                                            <p:txEl>
+                                              <p:pRg st="3" end="3"/>
+                                            </p:txEl>
+                                          </p:spTgt>
+                                        </p:tgtEl>
+                                        <p:attrNameLst>
+                                          <p:attrName>style.visibility</p:attrName>
+                                        </p:attrNameLst>
+                                      </p:cBhvr>
+                                      <p:to>
+                                        <p:strVal val="visible"/>
+                                      </p:to>
+                                    </p:set>
+                                  </p:childTnLst>
+                                </p:cTn>
+                              </p:par>
+                            </p:childTnLst>
+                          </p:cTn>
+                        </p:par>
+                      </p:childTnLst>
+                    </p:cTn>
+                  </p:par>
+                </p:childTnLst>
+              </p:cTn>
+              <p:prevCondLst>
+                <p:cond evt="onPrev" delay="0">
+                  <p:tgtEl>
+                    <p:sldTgt/>
+                  </p:tgtEl>
+                </p:cond>
+              </p:prevCondLst>
+              <p:nextCondLst>
+                <p:cond evt="onNext" delay="0">
+                  <p:tgtEl>
+                    <p:sldTgt/>
+                  </p:tgtEl>
+                </p:cond>
+              </p:nextCondLst>
+            </p:seq>
+          </p:childTnLst>
+        </p:cTn>
+      </p:par>
+    </p:tnLst>
+    <p:bldLst>
+      <p:bldP spid="9" grpId="0" build="p"/>
+    </p:bldLst>
+  </p:timing>
+</p:sld>
+</file>
+
+<file path=ppt/slides/slide2.xml><?xml version="1.0" encoding="utf-8"?>
+<p:sld xmlns:a="http://schemas.openxmlformats.org/drawingml/2006/main" xmlns:r="http://schemas.openxmlformats.org/officeDocument/2006/relationships" xmlns:p="http://schemas.openxmlformats.org/presentationml/2006/main">
+  <p:cSld>
+    <p:spTree>
+      <p:nvGrpSpPr>
+        <p:cNvPr id="1" name=""/>
+        <p:cNvGrpSpPr/>
+        <p:nvPr/>
+      </p:nvGrpSpPr>
+      <p:grpSpPr>
+        <a:xfrm>
+          <a:off x="0" y="0"/>
+          <a:ext cx="0" cy="0"/>
+          <a:chOff x="0" y="0"/>
+          <a:chExt cx="0" cy="0"/>
+        </a:xfrm>
+      </p:grpSpPr>
+      <p:sp>
+        <p:nvSpPr>
           <p:cNvPr id="3" name="Espaço Reservado para Número de Slide 2"/>
           <p:cNvSpPr>
             <a:spLocks noGrp="1"/>
@@ -7725,7 +8541,7 @@
               <a:pPr>
                 <a:defRPr/>
               </a:pPr>
-              <a:t>1</a:t>
+              <a:t>2</a:t>
             </a:fld>
             <a:endParaRPr lang="pt-BR" sz="880"/>
           </a:p>
@@ -8008,7 +8824,7 @@
         <p:spPr>
           <a:xfrm>
             <a:off x="6761554" y="2003797"/>
-            <a:ext cx="5760000" cy="2031325"/>
+            <a:ext cx="5760000" cy="1754326"/>
           </a:xfrm>
           <a:prstGeom prst="rect">
             <a:avLst/>
@@ -8089,18 +8905,6 @@
                 <a:latin typeface="Exo 2" panose="00000500000000000000" pitchFamily="50" charset="0"/>
               </a:rPr>
               <a:t>Entusiasta do esporte</a:t>
-            </a:r>
-          </a:p>
-          <a:p>
-            <a:pPr marL="342900" indent="-342900">
-              <a:buFont typeface="Arial" panose="020B0604020202020204" pitchFamily="34" charset="0"/>
-              <a:buChar char="•"/>
-            </a:pPr>
-            <a:r>
-              <a:rPr lang="pt-BR" sz="1800" dirty="0">
-                <a:latin typeface="Exo 2" panose="00000500000000000000" pitchFamily="50" charset="0"/>
-              </a:rPr>
-              <a:t>Consome bebida alcoólica</a:t>
             </a:r>
           </a:p>
         </p:txBody>
@@ -8470,7 +9274,655 @@
 </p:sld>
 </file>
 
-<file path=ppt/slides/slide2.xml><?xml version="1.0" encoding="utf-8"?>
+<file path=ppt/slides/slide3.xml><?xml version="1.0" encoding="utf-8"?>
+<p:sld xmlns:a="http://schemas.openxmlformats.org/drawingml/2006/main" xmlns:r="http://schemas.openxmlformats.org/officeDocument/2006/relationships" xmlns:p="http://schemas.openxmlformats.org/presentationml/2006/main">
+  <p:cSld>
+    <p:spTree>
+      <p:nvGrpSpPr>
+        <p:cNvPr id="1" name=""/>
+        <p:cNvGrpSpPr/>
+        <p:nvPr/>
+      </p:nvGrpSpPr>
+      <p:grpSpPr>
+        <a:xfrm>
+          <a:off x="0" y="0"/>
+          <a:ext cx="0" cy="0"/>
+          <a:chOff x="0" y="0"/>
+          <a:chExt cx="0" cy="0"/>
+        </a:xfrm>
+      </p:grpSpPr>
+      <p:sp>
+        <p:nvSpPr>
+          <p:cNvPr id="12" name="Espaço Reservado para Texto 3">
+            <a:extLst>
+              <a:ext uri="{FF2B5EF4-FFF2-40B4-BE49-F238E27FC236}">
+                <a16:creationId xmlns:a16="http://schemas.microsoft.com/office/drawing/2014/main" id="{02437B22-3E68-40EC-998E-1A031F4C1A0C}"/>
+              </a:ext>
+            </a:extLst>
+          </p:cNvPr>
+          <p:cNvSpPr txBox="1">
+            <a:spLocks/>
+          </p:cNvSpPr>
+          <p:nvPr/>
+        </p:nvSpPr>
+        <p:spPr>
+          <a:xfrm>
+            <a:off x="2184972" y="-82272"/>
+            <a:ext cx="10782599" cy="765639"/>
+          </a:xfrm>
+          <a:prstGeom prst="rect">
+            <a:avLst/>
+          </a:prstGeom>
+        </p:spPr>
+        <p:txBody>
+          <a:bodyPr anchor="t"/>
+          <a:lstStyle>
+            <a:lvl1pPr marL="431080" indent="-431080" algn="l" defTabSz="1149545" rtl="0" eaLnBrk="1" latinLnBrk="0" hangingPunct="1">
+              <a:spcBef>
+                <a:spcPct val="20000"/>
+              </a:spcBef>
+              <a:buFont typeface="Arial" pitchFamily="34" charset="0"/>
+              <a:buNone/>
+              <a:defRPr sz="3771" b="1" kern="1200" baseline="0">
+                <a:solidFill>
+                  <a:srgbClr val="32B9CD"/>
+                </a:solidFill>
+                <a:latin typeface="Exo 2" pitchFamily="50" charset="0"/>
+                <a:ea typeface="+mn-ea"/>
+                <a:cs typeface="+mn-cs"/>
+              </a:defRPr>
+            </a:lvl1pPr>
+            <a:lvl2pPr marL="934005" indent="-359233" algn="l" defTabSz="1149545" rtl="0" eaLnBrk="1" latinLnBrk="0" hangingPunct="1">
+              <a:spcBef>
+                <a:spcPct val="20000"/>
+              </a:spcBef>
+              <a:buFont typeface="Arial" pitchFamily="34" charset="0"/>
+              <a:buNone/>
+              <a:defRPr sz="3771" kern="1200">
+                <a:solidFill>
+                  <a:schemeClr val="tx1"/>
+                </a:solidFill>
+                <a:latin typeface="Exo 2" pitchFamily="50" charset="0"/>
+                <a:ea typeface="+mn-ea"/>
+                <a:cs typeface="+mn-cs"/>
+              </a:defRPr>
+            </a:lvl2pPr>
+            <a:lvl3pPr marL="1436931" indent="-287386" algn="l" defTabSz="1149545" rtl="0" eaLnBrk="1" latinLnBrk="0" hangingPunct="1">
+              <a:spcBef>
+                <a:spcPct val="20000"/>
+              </a:spcBef>
+              <a:buFont typeface="Arial" pitchFamily="34" charset="0"/>
+              <a:buNone/>
+              <a:defRPr sz="3771" kern="1200">
+                <a:solidFill>
+                  <a:schemeClr val="tx1"/>
+                </a:solidFill>
+                <a:latin typeface="Exo 2" pitchFamily="50" charset="0"/>
+                <a:ea typeface="+mn-ea"/>
+                <a:cs typeface="+mn-cs"/>
+              </a:defRPr>
+            </a:lvl3pPr>
+            <a:lvl4pPr marL="2011704" indent="-287386" algn="l" defTabSz="1149545" rtl="0" eaLnBrk="1" latinLnBrk="0" hangingPunct="1">
+              <a:spcBef>
+                <a:spcPct val="20000"/>
+              </a:spcBef>
+              <a:buFont typeface="Arial" pitchFamily="34" charset="0"/>
+              <a:buNone/>
+              <a:defRPr sz="3771" kern="1200">
+                <a:solidFill>
+                  <a:schemeClr val="tx1"/>
+                </a:solidFill>
+                <a:latin typeface="Exo 2" pitchFamily="50" charset="0"/>
+                <a:ea typeface="+mn-ea"/>
+                <a:cs typeface="+mn-cs"/>
+              </a:defRPr>
+            </a:lvl4pPr>
+            <a:lvl5pPr marL="2586478" indent="-287386" algn="l" defTabSz="1149545" rtl="0" eaLnBrk="1" latinLnBrk="0" hangingPunct="1">
+              <a:spcBef>
+                <a:spcPct val="20000"/>
+              </a:spcBef>
+              <a:buFont typeface="Arial" pitchFamily="34" charset="0"/>
+              <a:buNone/>
+              <a:defRPr sz="3771" kern="1200">
+                <a:solidFill>
+                  <a:schemeClr val="tx1"/>
+                </a:solidFill>
+                <a:latin typeface="Exo 2" pitchFamily="50" charset="0"/>
+                <a:ea typeface="+mn-ea"/>
+                <a:cs typeface="+mn-cs"/>
+              </a:defRPr>
+            </a:lvl5pPr>
+            <a:lvl6pPr marL="3161249" indent="-287386" algn="l" defTabSz="1149545" rtl="0" eaLnBrk="1" latinLnBrk="0" hangingPunct="1">
+              <a:spcBef>
+                <a:spcPct val="20000"/>
+              </a:spcBef>
+              <a:buFont typeface="Arial" pitchFamily="34" charset="0"/>
+              <a:buChar char="•"/>
+              <a:defRPr sz="2514" kern="1200">
+                <a:solidFill>
+                  <a:schemeClr val="tx1"/>
+                </a:solidFill>
+                <a:latin typeface="+mn-lt"/>
+                <a:ea typeface="+mn-ea"/>
+                <a:cs typeface="+mn-cs"/>
+              </a:defRPr>
+            </a:lvl6pPr>
+            <a:lvl7pPr marL="3736023" indent="-287386" algn="l" defTabSz="1149545" rtl="0" eaLnBrk="1" latinLnBrk="0" hangingPunct="1">
+              <a:spcBef>
+                <a:spcPct val="20000"/>
+              </a:spcBef>
+              <a:buFont typeface="Arial" pitchFamily="34" charset="0"/>
+              <a:buChar char="•"/>
+              <a:defRPr sz="2514" kern="1200">
+                <a:solidFill>
+                  <a:schemeClr val="tx1"/>
+                </a:solidFill>
+                <a:latin typeface="+mn-lt"/>
+                <a:ea typeface="+mn-ea"/>
+                <a:cs typeface="+mn-cs"/>
+              </a:defRPr>
+            </a:lvl7pPr>
+            <a:lvl8pPr marL="4310795" indent="-287386" algn="l" defTabSz="1149545" rtl="0" eaLnBrk="1" latinLnBrk="0" hangingPunct="1">
+              <a:spcBef>
+                <a:spcPct val="20000"/>
+              </a:spcBef>
+              <a:buFont typeface="Arial" pitchFamily="34" charset="0"/>
+              <a:buChar char="•"/>
+              <a:defRPr sz="2514" kern="1200">
+                <a:solidFill>
+                  <a:schemeClr val="tx1"/>
+                </a:solidFill>
+                <a:latin typeface="+mn-lt"/>
+                <a:ea typeface="+mn-ea"/>
+                <a:cs typeface="+mn-cs"/>
+              </a:defRPr>
+            </a:lvl8pPr>
+            <a:lvl9pPr marL="4885567" indent="-287386" algn="l" defTabSz="1149545" rtl="0" eaLnBrk="1" latinLnBrk="0" hangingPunct="1">
+              <a:spcBef>
+                <a:spcPct val="20000"/>
+              </a:spcBef>
+              <a:buFont typeface="Arial" pitchFamily="34" charset="0"/>
+              <a:buChar char="•"/>
+              <a:defRPr sz="2514" kern="1200">
+                <a:solidFill>
+                  <a:schemeClr val="tx1"/>
+                </a:solidFill>
+                <a:latin typeface="+mn-lt"/>
+                <a:ea typeface="+mn-ea"/>
+                <a:cs typeface="+mn-cs"/>
+              </a:defRPr>
+            </a:lvl9pPr>
+          </a:lstStyle>
+          <a:p>
+            <a:r>
+              <a:rPr lang="pt-BR" dirty="0"/>
+              <a:t>2. </a:t>
+            </a:r>
+            <a:r>
+              <a:rPr lang="pt-BR" dirty="0" err="1"/>
+              <a:t>Proto-Persona</a:t>
+            </a:r>
+            <a:r>
+              <a:rPr lang="pt-BR" dirty="0"/>
+              <a:t>, Dono da Quadra – Justificativa</a:t>
+            </a:r>
+          </a:p>
+        </p:txBody>
+      </p:sp>
+      <p:sp>
+        <p:nvSpPr>
+          <p:cNvPr id="13" name="Espaço Reservado para Número de Slide 2">
+            <a:extLst>
+              <a:ext uri="{FF2B5EF4-FFF2-40B4-BE49-F238E27FC236}">
+                <a16:creationId xmlns:a16="http://schemas.microsoft.com/office/drawing/2014/main" id="{A456E06A-E7FF-4998-988E-6F0ECAFA08FC}"/>
+              </a:ext>
+            </a:extLst>
+          </p:cNvPr>
+          <p:cNvSpPr txBox="1">
+            <a:spLocks/>
+          </p:cNvSpPr>
+          <p:nvPr/>
+        </p:nvSpPr>
+        <p:spPr bwMode="auto">
+          <a:xfrm>
+            <a:off x="12605478" y="7237015"/>
+            <a:ext cx="628646" cy="214290"/>
+          </a:xfrm>
+          <a:prstGeom prst="rect">
+            <a:avLst/>
+          </a:prstGeom>
+          <a:noFill/>
+          <a:ln w="9525">
+            <a:noFill/>
+            <a:miter lim="800000"/>
+            <a:headEnd/>
+            <a:tailEnd/>
+          </a:ln>
+          <a:effectLst/>
+        </p:spPr>
+        <p:txBody>
+          <a:bodyPr vert="horz" wrap="square" lIns="18000" tIns="10800" rIns="18000" bIns="10800" numCol="1" anchor="t" anchorCtr="0" compatLnSpc="1">
+            <a:prstTxWarp prst="textNoShape">
+              <a:avLst/>
+            </a:prstTxWarp>
+          </a:bodyPr>
+          <a:lstStyle>
+            <a:defPPr>
+              <a:defRPr lang="pt-BR"/>
+            </a:defPPr>
+            <a:lvl1pPr marL="0" algn="r" defTabSz="1043056" rtl="0" eaLnBrk="1" latinLnBrk="0" hangingPunct="1">
+              <a:spcBef>
+                <a:spcPct val="0"/>
+              </a:spcBef>
+              <a:spcAft>
+                <a:spcPct val="0"/>
+              </a:spcAft>
+              <a:defRPr sz="1257" b="1" kern="1200">
+                <a:solidFill>
+                  <a:schemeClr val="bg1"/>
+                </a:solidFill>
+                <a:latin typeface="Exo 2" pitchFamily="50" charset="0"/>
+                <a:ea typeface="Tahoma" pitchFamily="34" charset="0"/>
+                <a:cs typeface="Tahoma" pitchFamily="34" charset="0"/>
+              </a:defRPr>
+            </a:lvl1pPr>
+            <a:lvl2pPr marL="521528" algn="l" defTabSz="1043056" rtl="0" eaLnBrk="1" latinLnBrk="0" hangingPunct="1">
+              <a:defRPr sz="2100" kern="1200">
+                <a:solidFill>
+                  <a:schemeClr val="tx1"/>
+                </a:solidFill>
+                <a:latin typeface="+mn-lt"/>
+                <a:ea typeface="+mn-ea"/>
+                <a:cs typeface="+mn-cs"/>
+              </a:defRPr>
+            </a:lvl2pPr>
+            <a:lvl3pPr marL="1043056" algn="l" defTabSz="1043056" rtl="0" eaLnBrk="1" latinLnBrk="0" hangingPunct="1">
+              <a:defRPr sz="2100" kern="1200">
+                <a:solidFill>
+                  <a:schemeClr val="tx1"/>
+                </a:solidFill>
+                <a:latin typeface="+mn-lt"/>
+                <a:ea typeface="+mn-ea"/>
+                <a:cs typeface="+mn-cs"/>
+              </a:defRPr>
+            </a:lvl3pPr>
+            <a:lvl4pPr marL="1564584" algn="l" defTabSz="1043056" rtl="0" eaLnBrk="1" latinLnBrk="0" hangingPunct="1">
+              <a:defRPr sz="2100" kern="1200">
+                <a:solidFill>
+                  <a:schemeClr val="tx1"/>
+                </a:solidFill>
+                <a:latin typeface="+mn-lt"/>
+                <a:ea typeface="+mn-ea"/>
+                <a:cs typeface="+mn-cs"/>
+              </a:defRPr>
+            </a:lvl4pPr>
+            <a:lvl5pPr marL="2086112" algn="l" defTabSz="1043056" rtl="0" eaLnBrk="1" latinLnBrk="0" hangingPunct="1">
+              <a:defRPr sz="2100" kern="1200">
+                <a:solidFill>
+                  <a:schemeClr val="tx1"/>
+                </a:solidFill>
+                <a:latin typeface="+mn-lt"/>
+                <a:ea typeface="+mn-ea"/>
+                <a:cs typeface="+mn-cs"/>
+              </a:defRPr>
+            </a:lvl5pPr>
+            <a:lvl6pPr marL="2607640" algn="l" defTabSz="1043056" rtl="0" eaLnBrk="1" latinLnBrk="0" hangingPunct="1">
+              <a:defRPr sz="2100" kern="1200">
+                <a:solidFill>
+                  <a:schemeClr val="tx1"/>
+                </a:solidFill>
+                <a:latin typeface="+mn-lt"/>
+                <a:ea typeface="+mn-ea"/>
+                <a:cs typeface="+mn-cs"/>
+              </a:defRPr>
+            </a:lvl6pPr>
+            <a:lvl7pPr marL="3129168" algn="l" defTabSz="1043056" rtl="0" eaLnBrk="1" latinLnBrk="0" hangingPunct="1">
+              <a:defRPr sz="2100" kern="1200">
+                <a:solidFill>
+                  <a:schemeClr val="tx1"/>
+                </a:solidFill>
+                <a:latin typeface="+mn-lt"/>
+                <a:ea typeface="+mn-ea"/>
+                <a:cs typeface="+mn-cs"/>
+              </a:defRPr>
+            </a:lvl7pPr>
+            <a:lvl8pPr marL="3650696" algn="l" defTabSz="1043056" rtl="0" eaLnBrk="1" latinLnBrk="0" hangingPunct="1">
+              <a:defRPr sz="2100" kern="1200">
+                <a:solidFill>
+                  <a:schemeClr val="tx1"/>
+                </a:solidFill>
+                <a:latin typeface="+mn-lt"/>
+                <a:ea typeface="+mn-ea"/>
+                <a:cs typeface="+mn-cs"/>
+              </a:defRPr>
+            </a:lvl8pPr>
+            <a:lvl9pPr marL="4172224" algn="l" defTabSz="1043056" rtl="0" eaLnBrk="1" latinLnBrk="0" hangingPunct="1">
+              <a:defRPr sz="2100" kern="1200">
+                <a:solidFill>
+                  <a:schemeClr val="tx1"/>
+                </a:solidFill>
+                <a:latin typeface="+mn-lt"/>
+                <a:ea typeface="+mn-ea"/>
+                <a:cs typeface="+mn-cs"/>
+              </a:defRPr>
+            </a:lvl9pPr>
+          </a:lstStyle>
+          <a:p>
+            <a:pPr>
+              <a:defRPr/>
+            </a:pPr>
+            <a:r>
+              <a:rPr lang="pt-BR"/>
+              <a:t>1</a:t>
+            </a:r>
+            <a:endParaRPr lang="pt-BR" sz="880"/>
+          </a:p>
+        </p:txBody>
+      </p:sp>
+      <p:sp>
+        <p:nvSpPr>
+          <p:cNvPr id="14" name="Espaço Reservado para Texto 1">
+            <a:extLst>
+              <a:ext uri="{FF2B5EF4-FFF2-40B4-BE49-F238E27FC236}">
+                <a16:creationId xmlns:a16="http://schemas.microsoft.com/office/drawing/2014/main" id="{866306A9-09F0-4496-BC52-145D163117F3}"/>
+              </a:ext>
+            </a:extLst>
+          </p:cNvPr>
+          <p:cNvSpPr txBox="1">
+            <a:spLocks/>
+          </p:cNvSpPr>
+          <p:nvPr/>
+        </p:nvSpPr>
+        <p:spPr>
+          <a:xfrm>
+            <a:off x="610094" y="1109608"/>
+            <a:ext cx="12448085" cy="3312368"/>
+          </a:xfrm>
+          <a:prstGeom prst="rect">
+            <a:avLst/>
+          </a:prstGeom>
+        </p:spPr>
+        <p:txBody>
+          <a:bodyPr/>
+          <a:lstStyle>
+            <a:lvl1pPr marL="431080" indent="-431080" algn="l" defTabSz="1149545" rtl="0" eaLnBrk="1" latinLnBrk="0" hangingPunct="1">
+              <a:spcBef>
+                <a:spcPct val="20000"/>
+              </a:spcBef>
+              <a:buFont typeface="Arial" pitchFamily="34" charset="0"/>
+              <a:buChar char="•"/>
+              <a:defRPr sz="4023" kern="1200">
+                <a:solidFill>
+                  <a:schemeClr val="tx1"/>
+                </a:solidFill>
+                <a:latin typeface="+mn-lt"/>
+                <a:ea typeface="+mn-ea"/>
+                <a:cs typeface="+mn-cs"/>
+              </a:defRPr>
+            </a:lvl1pPr>
+            <a:lvl2pPr marL="934005" indent="-359233" algn="l" defTabSz="1149545" rtl="0" eaLnBrk="1" latinLnBrk="0" hangingPunct="1">
+              <a:spcBef>
+                <a:spcPct val="20000"/>
+              </a:spcBef>
+              <a:buFont typeface="Arial" pitchFamily="34" charset="0"/>
+              <a:buChar char="–"/>
+              <a:defRPr sz="3520" kern="1200">
+                <a:solidFill>
+                  <a:schemeClr val="tx1"/>
+                </a:solidFill>
+                <a:latin typeface="+mn-lt"/>
+                <a:ea typeface="+mn-ea"/>
+                <a:cs typeface="+mn-cs"/>
+              </a:defRPr>
+            </a:lvl2pPr>
+            <a:lvl3pPr marL="1436931" indent="-287386" algn="l" defTabSz="1149545" rtl="0" eaLnBrk="1" latinLnBrk="0" hangingPunct="1">
+              <a:spcBef>
+                <a:spcPct val="20000"/>
+              </a:spcBef>
+              <a:buFont typeface="Arial" pitchFamily="34" charset="0"/>
+              <a:buChar char="•"/>
+              <a:defRPr sz="3017" kern="1200">
+                <a:solidFill>
+                  <a:schemeClr val="tx1"/>
+                </a:solidFill>
+                <a:latin typeface="+mn-lt"/>
+                <a:ea typeface="+mn-ea"/>
+                <a:cs typeface="+mn-cs"/>
+              </a:defRPr>
+            </a:lvl3pPr>
+            <a:lvl4pPr marL="2011704" indent="-287386" algn="l" defTabSz="1149545" rtl="0" eaLnBrk="1" latinLnBrk="0" hangingPunct="1">
+              <a:spcBef>
+                <a:spcPct val="20000"/>
+              </a:spcBef>
+              <a:buFont typeface="Arial" pitchFamily="34" charset="0"/>
+              <a:buChar char="–"/>
+              <a:defRPr sz="2514" kern="1200">
+                <a:solidFill>
+                  <a:schemeClr val="tx1"/>
+                </a:solidFill>
+                <a:latin typeface="+mn-lt"/>
+                <a:ea typeface="+mn-ea"/>
+                <a:cs typeface="+mn-cs"/>
+              </a:defRPr>
+            </a:lvl4pPr>
+            <a:lvl5pPr marL="2586478" indent="-287386" algn="l" defTabSz="1149545" rtl="0" eaLnBrk="1" latinLnBrk="0" hangingPunct="1">
+              <a:spcBef>
+                <a:spcPct val="20000"/>
+              </a:spcBef>
+              <a:buFont typeface="Arial" pitchFamily="34" charset="0"/>
+              <a:buChar char="»"/>
+              <a:defRPr sz="2514" kern="1200">
+                <a:solidFill>
+                  <a:schemeClr val="tx1"/>
+                </a:solidFill>
+                <a:latin typeface="+mn-lt"/>
+                <a:ea typeface="+mn-ea"/>
+                <a:cs typeface="+mn-cs"/>
+              </a:defRPr>
+            </a:lvl5pPr>
+            <a:lvl6pPr marL="3161249" indent="-287386" algn="l" defTabSz="1149545" rtl="0" eaLnBrk="1" latinLnBrk="0" hangingPunct="1">
+              <a:spcBef>
+                <a:spcPct val="20000"/>
+              </a:spcBef>
+              <a:buFont typeface="Arial" pitchFamily="34" charset="0"/>
+              <a:buChar char="•"/>
+              <a:defRPr sz="2514" kern="1200">
+                <a:solidFill>
+                  <a:schemeClr val="tx1"/>
+                </a:solidFill>
+                <a:latin typeface="+mn-lt"/>
+                <a:ea typeface="+mn-ea"/>
+                <a:cs typeface="+mn-cs"/>
+              </a:defRPr>
+            </a:lvl6pPr>
+            <a:lvl7pPr marL="3736023" indent="-287386" algn="l" defTabSz="1149545" rtl="0" eaLnBrk="1" latinLnBrk="0" hangingPunct="1">
+              <a:spcBef>
+                <a:spcPct val="20000"/>
+              </a:spcBef>
+              <a:buFont typeface="Arial" pitchFamily="34" charset="0"/>
+              <a:buChar char="•"/>
+              <a:defRPr sz="2514" kern="1200">
+                <a:solidFill>
+                  <a:schemeClr val="tx1"/>
+                </a:solidFill>
+                <a:latin typeface="+mn-lt"/>
+                <a:ea typeface="+mn-ea"/>
+                <a:cs typeface="+mn-cs"/>
+              </a:defRPr>
+            </a:lvl7pPr>
+            <a:lvl8pPr marL="4310795" indent="-287386" algn="l" defTabSz="1149545" rtl="0" eaLnBrk="1" latinLnBrk="0" hangingPunct="1">
+              <a:spcBef>
+                <a:spcPct val="20000"/>
+              </a:spcBef>
+              <a:buFont typeface="Arial" pitchFamily="34" charset="0"/>
+              <a:buChar char="•"/>
+              <a:defRPr sz="2514" kern="1200">
+                <a:solidFill>
+                  <a:schemeClr val="tx1"/>
+                </a:solidFill>
+                <a:latin typeface="+mn-lt"/>
+                <a:ea typeface="+mn-ea"/>
+                <a:cs typeface="+mn-cs"/>
+              </a:defRPr>
+            </a:lvl8pPr>
+            <a:lvl9pPr marL="4885567" indent="-287386" algn="l" defTabSz="1149545" rtl="0" eaLnBrk="1" latinLnBrk="0" hangingPunct="1">
+              <a:spcBef>
+                <a:spcPct val="20000"/>
+              </a:spcBef>
+              <a:buFont typeface="Arial" pitchFamily="34" charset="0"/>
+              <a:buChar char="•"/>
+              <a:defRPr sz="2514" kern="1200">
+                <a:solidFill>
+                  <a:schemeClr val="tx1"/>
+                </a:solidFill>
+                <a:latin typeface="+mn-lt"/>
+                <a:ea typeface="+mn-ea"/>
+                <a:cs typeface="+mn-cs"/>
+              </a:defRPr>
+            </a:lvl9pPr>
+          </a:lstStyle>
+          <a:p>
+            <a:pPr lvl="1"/>
+            <a:endParaRPr lang="pt-BR" sz="3200" dirty="0"/>
+          </a:p>
+        </p:txBody>
+      </p:sp>
+      <p:sp>
+        <p:nvSpPr>
+          <p:cNvPr id="15" name="CaixaDeTexto 14">
+            <a:extLst>
+              <a:ext uri="{FF2B5EF4-FFF2-40B4-BE49-F238E27FC236}">
+                <a16:creationId xmlns:a16="http://schemas.microsoft.com/office/drawing/2014/main" id="{D0938F08-93F6-4EE8-AF9A-BBAD4BA0633F}"/>
+              </a:ext>
+            </a:extLst>
+          </p:cNvPr>
+          <p:cNvSpPr txBox="1"/>
+          <p:nvPr/>
+        </p:nvSpPr>
+        <p:spPr>
+          <a:xfrm>
+            <a:off x="1550020" y="1962615"/>
+            <a:ext cx="9891131" cy="2031325"/>
+          </a:xfrm>
+          <a:prstGeom prst="rect">
+            <a:avLst/>
+          </a:prstGeom>
+          <a:noFill/>
+        </p:spPr>
+        <p:txBody>
+          <a:bodyPr wrap="square" rtlCol="0">
+            <a:spAutoFit/>
+          </a:bodyPr>
+          <a:lstStyle/>
+          <a:p>
+            <a:r>
+              <a:rPr lang="pt-BR" dirty="0"/>
+              <a:t>- Buscamos entender primeiro como funciona dominantemente o meio do esporte, e depois o que enxergamos como valor dos donos de locais para praticas de esportes, na verdade nós agrupamos também por convencia com essas pessoas que tem esse tipo de empreendimento e já tínhamos de fato alguma ideia, mas através de algumas pesquisas pudemos constatar que eles de modo geral, tinham como um valor fortemente presente a reunião de amigos e socialização também além claro da pratica de esportes</a:t>
+            </a:r>
+          </a:p>
+        </p:txBody>
+      </p:sp>
+    </p:spTree>
+    <p:extLst>
+      <p:ext uri="{BB962C8B-B14F-4D97-AF65-F5344CB8AC3E}">
+        <p14:creationId xmlns:p14="http://schemas.microsoft.com/office/powerpoint/2010/main" val="2472667474"/>
+      </p:ext>
+    </p:extLst>
+  </p:cSld>
+  <p:clrMapOvr>
+    <a:masterClrMapping/>
+  </p:clrMapOvr>
+  <p:timing>
+    <p:tnLst>
+      <p:par>
+        <p:cTn id="1" dur="indefinite" restart="never" nodeType="tmRoot">
+          <p:childTnLst>
+            <p:seq concurrent="1" nextAc="seek">
+              <p:cTn id="2" dur="indefinite" nodeType="mainSeq">
+                <p:childTnLst>
+                  <p:par>
+                    <p:cTn id="3" fill="hold">
+                      <p:stCondLst>
+                        <p:cond delay="indefinite"/>
+                      </p:stCondLst>
+                      <p:childTnLst>
+                        <p:par>
+                          <p:cTn id="4" fill="hold">
+                            <p:stCondLst>
+                              <p:cond delay="0"/>
+                            </p:stCondLst>
+                            <p:childTnLst>
+                              <p:par>
+                                <p:cTn id="5" presetID="1" presetClass="entr" presetSubtype="0" fill="hold" grpId="0" nodeType="clickEffect" nodePh="1">
+                                  <p:stCondLst>
+                                    <p:cond delay="0"/>
+                                  </p:stCondLst>
+                                  <p:endCondLst>
+                                    <p:cond evt="begin" delay="0">
+                                      <p:tn val="5"/>
+                                    </p:cond>
+                                  </p:endCondLst>
+                                  <p:childTnLst>
+                                    <p:set>
+                                      <p:cBhvr>
+                                        <p:cTn id="6" dur="1" fill="hold">
+                                          <p:stCondLst>
+                                            <p:cond delay="0"/>
+                                          </p:stCondLst>
+                                        </p:cTn>
+                                        <p:tgtEl>
+                                          <p:spTgt spid="14">
+                                            <p:txEl>
+                                              <p:pRg st="0" end="0"/>
+                                            </p:txEl>
+                                          </p:spTgt>
+                                        </p:tgtEl>
+                                        <p:attrNameLst>
+                                          <p:attrName>style.visibility</p:attrName>
+                                        </p:attrNameLst>
+                                      </p:cBhvr>
+                                      <p:to>
+                                        <p:strVal val="visible"/>
+                                      </p:to>
+                                    </p:set>
+                                  </p:childTnLst>
+                                </p:cTn>
+                              </p:par>
+                            </p:childTnLst>
+                          </p:cTn>
+                        </p:par>
+                      </p:childTnLst>
+                    </p:cTn>
+                  </p:par>
+                </p:childTnLst>
+              </p:cTn>
+              <p:prevCondLst>
+                <p:cond evt="onPrev" delay="0">
+                  <p:tgtEl>
+                    <p:sldTgt/>
+                  </p:tgtEl>
+                </p:cond>
+              </p:prevCondLst>
+              <p:nextCondLst>
+                <p:cond evt="onNext" delay="0">
+                  <p:tgtEl>
+                    <p:sldTgt/>
+                  </p:tgtEl>
+                </p:cond>
+              </p:nextCondLst>
+            </p:seq>
+          </p:childTnLst>
+        </p:cTn>
+      </p:par>
+    </p:tnLst>
+    <p:bldLst>
+      <p:bldP spid="14" grpId="0" build="p"/>
+    </p:bldLst>
+  </p:timing>
+</p:sld>
+</file>
+
+<file path=ppt/slides/slide4.xml><?xml version="1.0" encoding="utf-8"?>
 <p:sld xmlns:a="http://schemas.openxmlformats.org/drawingml/2006/main" xmlns:r="http://schemas.openxmlformats.org/officeDocument/2006/relationships" xmlns:p="http://schemas.openxmlformats.org/presentationml/2006/main">
   <p:cSld>
     <p:spTree>
@@ -8510,7 +9962,7 @@
               <a:pPr>
                 <a:defRPr/>
               </a:pPr>
-              <a:t>2</a:t>
+              <a:t>4</a:t>
             </a:fld>
             <a:endParaRPr lang="pt-BR" sz="880" dirty="0"/>
           </a:p>
@@ -9099,7 +10551,7 @@
 </p:sld>
 </file>
 
-<file path=ppt/slides/slide3.xml><?xml version="1.0" encoding="utf-8"?>
+<file path=ppt/slides/slide5.xml><?xml version="1.0" encoding="utf-8"?>
 <p:sld xmlns:a="http://schemas.openxmlformats.org/drawingml/2006/main" xmlns:r="http://schemas.openxmlformats.org/officeDocument/2006/relationships" xmlns:p="http://schemas.openxmlformats.org/presentationml/2006/main">
   <p:cSld>
     <p:spTree>
@@ -9144,7 +10596,7 @@
               <a:pPr>
                 <a:defRPr/>
               </a:pPr>
-              <a:t>3</a:t>
+              <a:t>5</a:t>
             </a:fld>
             <a:endParaRPr lang="pt-BR" sz="880"/>
           </a:p>
@@ -9360,7 +10812,7 @@
         <p:spPr>
           <a:xfrm>
             <a:off x="2898119" y="2171973"/>
-            <a:ext cx="3723169" cy="1569660"/>
+            <a:ext cx="3723169" cy="1077218"/>
           </a:xfrm>
           <a:prstGeom prst="rect">
             <a:avLst/>
@@ -9373,18 +10825,15 @@
           <a:lstStyle/>
           <a:p>
             <a:r>
-              <a:rPr lang="pt-BR" sz="1600">
+              <a:rPr lang="pt-BR" sz="1600" dirty="0">
                 <a:latin typeface="Exo 2" panose="00000500000000000000" pitchFamily="50" charset="0"/>
               </a:rPr>
               <a:t>Paulo</a:t>
             </a:r>
-            <a:endParaRPr lang="pt-BR" sz="1600" dirty="0">
-              <a:latin typeface="Exo 2" panose="00000500000000000000" pitchFamily="50" charset="0"/>
-            </a:endParaRPr>
-          </a:p>
-          <a:p>
-            <a:r>
-              <a:rPr lang="pt-BR" sz="1600">
+          </a:p>
+          <a:p>
+            <a:r>
+              <a:rPr lang="pt-BR" sz="1600" dirty="0">
                 <a:latin typeface="Exo 2"/>
               </a:rPr>
               <a:t>"Sou Amante de esporte"</a:t>
@@ -9392,10 +10841,10 @@
           </a:p>
           <a:p>
             <a:r>
-              <a:rPr lang="pt-BR" sz="1600">
+              <a:rPr lang="pt-BR" sz="1600" dirty="0">
                 <a:latin typeface="Exo 2"/>
               </a:rPr>
-              <a:t>30 anos de idade</a:t>
+              <a:t>Adulto</a:t>
             </a:r>
           </a:p>
           <a:p>
@@ -9404,22 +10853,6 @@
                 <a:latin typeface="Exo 2" panose="00000500000000000000" pitchFamily="50" charset="0"/>
               </a:rPr>
               <a:t>Masculino</a:t>
-            </a:r>
-          </a:p>
-          <a:p>
-            <a:r>
-              <a:rPr lang="pt-BR" sz="1600" dirty="0">
-                <a:latin typeface="Exo 2" panose="00000500000000000000" pitchFamily="50" charset="0"/>
-              </a:rPr>
-              <a:t>1 filho(a)</a:t>
-            </a:r>
-          </a:p>
-          <a:p>
-            <a:r>
-              <a:rPr lang="pt-BR" sz="1600" dirty="0">
-                <a:latin typeface="Exo 2" panose="00000500000000000000" pitchFamily="50" charset="0"/>
-              </a:rPr>
-              <a:t>Casado</a:t>
             </a:r>
           </a:p>
         </p:txBody>
@@ -9940,7 +11373,663 @@
 </p:sld>
 </file>
 
-<file path=ppt/slides/slide4.xml><?xml version="1.0" encoding="utf-8"?>
+<file path=ppt/slides/slide6.xml><?xml version="1.0" encoding="utf-8"?>
+<p:sld xmlns:a="http://schemas.openxmlformats.org/drawingml/2006/main" xmlns:r="http://schemas.openxmlformats.org/officeDocument/2006/relationships" xmlns:p="http://schemas.openxmlformats.org/presentationml/2006/main">
+  <p:cSld>
+    <p:spTree>
+      <p:nvGrpSpPr>
+        <p:cNvPr id="1" name=""/>
+        <p:cNvGrpSpPr/>
+        <p:nvPr/>
+      </p:nvGrpSpPr>
+      <p:grpSpPr>
+        <a:xfrm>
+          <a:off x="0" y="0"/>
+          <a:ext cx="0" cy="0"/>
+          <a:chOff x="0" y="0"/>
+          <a:chExt cx="0" cy="0"/>
+        </a:xfrm>
+      </p:grpSpPr>
+      <p:sp>
+        <p:nvSpPr>
+          <p:cNvPr id="12" name="Espaço Reservado para Texto 3">
+            <a:extLst>
+              <a:ext uri="{FF2B5EF4-FFF2-40B4-BE49-F238E27FC236}">
+                <a16:creationId xmlns:a16="http://schemas.microsoft.com/office/drawing/2014/main" id="{02437B22-3E68-40EC-998E-1A031F4C1A0C}"/>
+              </a:ext>
+            </a:extLst>
+          </p:cNvPr>
+          <p:cNvSpPr txBox="1">
+            <a:spLocks/>
+          </p:cNvSpPr>
+          <p:nvPr/>
+        </p:nvSpPr>
+        <p:spPr>
+          <a:xfrm>
+            <a:off x="2184972" y="-82272"/>
+            <a:ext cx="10782599" cy="765639"/>
+          </a:xfrm>
+          <a:prstGeom prst="rect">
+            <a:avLst/>
+          </a:prstGeom>
+        </p:spPr>
+        <p:txBody>
+          <a:bodyPr anchor="t"/>
+          <a:lstStyle>
+            <a:lvl1pPr marL="431080" indent="-431080" algn="l" defTabSz="1149545" rtl="0" eaLnBrk="1" latinLnBrk="0" hangingPunct="1">
+              <a:spcBef>
+                <a:spcPct val="20000"/>
+              </a:spcBef>
+              <a:buFont typeface="Arial" pitchFamily="34" charset="0"/>
+              <a:buNone/>
+              <a:defRPr sz="3771" b="1" kern="1200" baseline="0">
+                <a:solidFill>
+                  <a:srgbClr val="32B9CD"/>
+                </a:solidFill>
+                <a:latin typeface="Exo 2" pitchFamily="50" charset="0"/>
+                <a:ea typeface="+mn-ea"/>
+                <a:cs typeface="+mn-cs"/>
+              </a:defRPr>
+            </a:lvl1pPr>
+            <a:lvl2pPr marL="934005" indent="-359233" algn="l" defTabSz="1149545" rtl="0" eaLnBrk="1" latinLnBrk="0" hangingPunct="1">
+              <a:spcBef>
+                <a:spcPct val="20000"/>
+              </a:spcBef>
+              <a:buFont typeface="Arial" pitchFamily="34" charset="0"/>
+              <a:buNone/>
+              <a:defRPr sz="3771" kern="1200">
+                <a:solidFill>
+                  <a:schemeClr val="tx1"/>
+                </a:solidFill>
+                <a:latin typeface="Exo 2" pitchFamily="50" charset="0"/>
+                <a:ea typeface="+mn-ea"/>
+                <a:cs typeface="+mn-cs"/>
+              </a:defRPr>
+            </a:lvl2pPr>
+            <a:lvl3pPr marL="1436931" indent="-287386" algn="l" defTabSz="1149545" rtl="0" eaLnBrk="1" latinLnBrk="0" hangingPunct="1">
+              <a:spcBef>
+                <a:spcPct val="20000"/>
+              </a:spcBef>
+              <a:buFont typeface="Arial" pitchFamily="34" charset="0"/>
+              <a:buNone/>
+              <a:defRPr sz="3771" kern="1200">
+                <a:solidFill>
+                  <a:schemeClr val="tx1"/>
+                </a:solidFill>
+                <a:latin typeface="Exo 2" pitchFamily="50" charset="0"/>
+                <a:ea typeface="+mn-ea"/>
+                <a:cs typeface="+mn-cs"/>
+              </a:defRPr>
+            </a:lvl3pPr>
+            <a:lvl4pPr marL="2011704" indent="-287386" algn="l" defTabSz="1149545" rtl="0" eaLnBrk="1" latinLnBrk="0" hangingPunct="1">
+              <a:spcBef>
+                <a:spcPct val="20000"/>
+              </a:spcBef>
+              <a:buFont typeface="Arial" pitchFamily="34" charset="0"/>
+              <a:buNone/>
+              <a:defRPr sz="3771" kern="1200">
+                <a:solidFill>
+                  <a:schemeClr val="tx1"/>
+                </a:solidFill>
+                <a:latin typeface="Exo 2" pitchFamily="50" charset="0"/>
+                <a:ea typeface="+mn-ea"/>
+                <a:cs typeface="+mn-cs"/>
+              </a:defRPr>
+            </a:lvl4pPr>
+            <a:lvl5pPr marL="2586478" indent="-287386" algn="l" defTabSz="1149545" rtl="0" eaLnBrk="1" latinLnBrk="0" hangingPunct="1">
+              <a:spcBef>
+                <a:spcPct val="20000"/>
+              </a:spcBef>
+              <a:buFont typeface="Arial" pitchFamily="34" charset="0"/>
+              <a:buNone/>
+              <a:defRPr sz="3771" kern="1200">
+                <a:solidFill>
+                  <a:schemeClr val="tx1"/>
+                </a:solidFill>
+                <a:latin typeface="Exo 2" pitchFamily="50" charset="0"/>
+                <a:ea typeface="+mn-ea"/>
+                <a:cs typeface="+mn-cs"/>
+              </a:defRPr>
+            </a:lvl5pPr>
+            <a:lvl6pPr marL="3161249" indent="-287386" algn="l" defTabSz="1149545" rtl="0" eaLnBrk="1" latinLnBrk="0" hangingPunct="1">
+              <a:spcBef>
+                <a:spcPct val="20000"/>
+              </a:spcBef>
+              <a:buFont typeface="Arial" pitchFamily="34" charset="0"/>
+              <a:buChar char="•"/>
+              <a:defRPr sz="2514" kern="1200">
+                <a:solidFill>
+                  <a:schemeClr val="tx1"/>
+                </a:solidFill>
+                <a:latin typeface="+mn-lt"/>
+                <a:ea typeface="+mn-ea"/>
+                <a:cs typeface="+mn-cs"/>
+              </a:defRPr>
+            </a:lvl6pPr>
+            <a:lvl7pPr marL="3736023" indent="-287386" algn="l" defTabSz="1149545" rtl="0" eaLnBrk="1" latinLnBrk="0" hangingPunct="1">
+              <a:spcBef>
+                <a:spcPct val="20000"/>
+              </a:spcBef>
+              <a:buFont typeface="Arial" pitchFamily="34" charset="0"/>
+              <a:buChar char="•"/>
+              <a:defRPr sz="2514" kern="1200">
+                <a:solidFill>
+                  <a:schemeClr val="tx1"/>
+                </a:solidFill>
+                <a:latin typeface="+mn-lt"/>
+                <a:ea typeface="+mn-ea"/>
+                <a:cs typeface="+mn-cs"/>
+              </a:defRPr>
+            </a:lvl7pPr>
+            <a:lvl8pPr marL="4310795" indent="-287386" algn="l" defTabSz="1149545" rtl="0" eaLnBrk="1" latinLnBrk="0" hangingPunct="1">
+              <a:spcBef>
+                <a:spcPct val="20000"/>
+              </a:spcBef>
+              <a:buFont typeface="Arial" pitchFamily="34" charset="0"/>
+              <a:buChar char="•"/>
+              <a:defRPr sz="2514" kern="1200">
+                <a:solidFill>
+                  <a:schemeClr val="tx1"/>
+                </a:solidFill>
+                <a:latin typeface="+mn-lt"/>
+                <a:ea typeface="+mn-ea"/>
+                <a:cs typeface="+mn-cs"/>
+              </a:defRPr>
+            </a:lvl8pPr>
+            <a:lvl9pPr marL="4885567" indent="-287386" algn="l" defTabSz="1149545" rtl="0" eaLnBrk="1" latinLnBrk="0" hangingPunct="1">
+              <a:spcBef>
+                <a:spcPct val="20000"/>
+              </a:spcBef>
+              <a:buFont typeface="Arial" pitchFamily="34" charset="0"/>
+              <a:buChar char="•"/>
+              <a:defRPr sz="2514" kern="1200">
+                <a:solidFill>
+                  <a:schemeClr val="tx1"/>
+                </a:solidFill>
+                <a:latin typeface="+mn-lt"/>
+                <a:ea typeface="+mn-ea"/>
+                <a:cs typeface="+mn-cs"/>
+              </a:defRPr>
+            </a:lvl9pPr>
+          </a:lstStyle>
+          <a:p>
+            <a:r>
+              <a:rPr lang="pt-BR" dirty="0"/>
+              <a:t>2. </a:t>
+            </a:r>
+            <a:r>
+              <a:rPr lang="pt-BR" dirty="0" err="1"/>
+              <a:t>Proto-Persona</a:t>
+            </a:r>
+            <a:r>
+              <a:rPr lang="pt-BR" dirty="0"/>
+              <a:t>, Dono da Quadra – Justificativa</a:t>
+            </a:r>
+          </a:p>
+        </p:txBody>
+      </p:sp>
+      <p:sp>
+        <p:nvSpPr>
+          <p:cNvPr id="13" name="Espaço Reservado para Número de Slide 2">
+            <a:extLst>
+              <a:ext uri="{FF2B5EF4-FFF2-40B4-BE49-F238E27FC236}">
+                <a16:creationId xmlns:a16="http://schemas.microsoft.com/office/drawing/2014/main" id="{A456E06A-E7FF-4998-988E-6F0ECAFA08FC}"/>
+              </a:ext>
+            </a:extLst>
+          </p:cNvPr>
+          <p:cNvSpPr txBox="1">
+            <a:spLocks/>
+          </p:cNvSpPr>
+          <p:nvPr/>
+        </p:nvSpPr>
+        <p:spPr bwMode="auto">
+          <a:xfrm>
+            <a:off x="12605478" y="7237015"/>
+            <a:ext cx="628646" cy="214290"/>
+          </a:xfrm>
+          <a:prstGeom prst="rect">
+            <a:avLst/>
+          </a:prstGeom>
+          <a:noFill/>
+          <a:ln w="9525">
+            <a:noFill/>
+            <a:miter lim="800000"/>
+            <a:headEnd/>
+            <a:tailEnd/>
+          </a:ln>
+          <a:effectLst/>
+        </p:spPr>
+        <p:txBody>
+          <a:bodyPr vert="horz" wrap="square" lIns="18000" tIns="10800" rIns="18000" bIns="10800" numCol="1" anchor="t" anchorCtr="0" compatLnSpc="1">
+            <a:prstTxWarp prst="textNoShape">
+              <a:avLst/>
+            </a:prstTxWarp>
+          </a:bodyPr>
+          <a:lstStyle>
+            <a:defPPr>
+              <a:defRPr lang="pt-BR"/>
+            </a:defPPr>
+            <a:lvl1pPr marL="0" algn="r" defTabSz="1043056" rtl="0" eaLnBrk="1" latinLnBrk="0" hangingPunct="1">
+              <a:spcBef>
+                <a:spcPct val="0"/>
+              </a:spcBef>
+              <a:spcAft>
+                <a:spcPct val="0"/>
+              </a:spcAft>
+              <a:defRPr sz="1257" b="1" kern="1200">
+                <a:solidFill>
+                  <a:schemeClr val="bg1"/>
+                </a:solidFill>
+                <a:latin typeface="Exo 2" pitchFamily="50" charset="0"/>
+                <a:ea typeface="Tahoma" pitchFamily="34" charset="0"/>
+                <a:cs typeface="Tahoma" pitchFamily="34" charset="0"/>
+              </a:defRPr>
+            </a:lvl1pPr>
+            <a:lvl2pPr marL="521528" algn="l" defTabSz="1043056" rtl="0" eaLnBrk="1" latinLnBrk="0" hangingPunct="1">
+              <a:defRPr sz="2100" kern="1200">
+                <a:solidFill>
+                  <a:schemeClr val="tx1"/>
+                </a:solidFill>
+                <a:latin typeface="+mn-lt"/>
+                <a:ea typeface="+mn-ea"/>
+                <a:cs typeface="+mn-cs"/>
+              </a:defRPr>
+            </a:lvl2pPr>
+            <a:lvl3pPr marL="1043056" algn="l" defTabSz="1043056" rtl="0" eaLnBrk="1" latinLnBrk="0" hangingPunct="1">
+              <a:defRPr sz="2100" kern="1200">
+                <a:solidFill>
+                  <a:schemeClr val="tx1"/>
+                </a:solidFill>
+                <a:latin typeface="+mn-lt"/>
+                <a:ea typeface="+mn-ea"/>
+                <a:cs typeface="+mn-cs"/>
+              </a:defRPr>
+            </a:lvl3pPr>
+            <a:lvl4pPr marL="1564584" algn="l" defTabSz="1043056" rtl="0" eaLnBrk="1" latinLnBrk="0" hangingPunct="1">
+              <a:defRPr sz="2100" kern="1200">
+                <a:solidFill>
+                  <a:schemeClr val="tx1"/>
+                </a:solidFill>
+                <a:latin typeface="+mn-lt"/>
+                <a:ea typeface="+mn-ea"/>
+                <a:cs typeface="+mn-cs"/>
+              </a:defRPr>
+            </a:lvl4pPr>
+            <a:lvl5pPr marL="2086112" algn="l" defTabSz="1043056" rtl="0" eaLnBrk="1" latinLnBrk="0" hangingPunct="1">
+              <a:defRPr sz="2100" kern="1200">
+                <a:solidFill>
+                  <a:schemeClr val="tx1"/>
+                </a:solidFill>
+                <a:latin typeface="+mn-lt"/>
+                <a:ea typeface="+mn-ea"/>
+                <a:cs typeface="+mn-cs"/>
+              </a:defRPr>
+            </a:lvl5pPr>
+            <a:lvl6pPr marL="2607640" algn="l" defTabSz="1043056" rtl="0" eaLnBrk="1" latinLnBrk="0" hangingPunct="1">
+              <a:defRPr sz="2100" kern="1200">
+                <a:solidFill>
+                  <a:schemeClr val="tx1"/>
+                </a:solidFill>
+                <a:latin typeface="+mn-lt"/>
+                <a:ea typeface="+mn-ea"/>
+                <a:cs typeface="+mn-cs"/>
+              </a:defRPr>
+            </a:lvl6pPr>
+            <a:lvl7pPr marL="3129168" algn="l" defTabSz="1043056" rtl="0" eaLnBrk="1" latinLnBrk="0" hangingPunct="1">
+              <a:defRPr sz="2100" kern="1200">
+                <a:solidFill>
+                  <a:schemeClr val="tx1"/>
+                </a:solidFill>
+                <a:latin typeface="+mn-lt"/>
+                <a:ea typeface="+mn-ea"/>
+                <a:cs typeface="+mn-cs"/>
+              </a:defRPr>
+            </a:lvl7pPr>
+            <a:lvl8pPr marL="3650696" algn="l" defTabSz="1043056" rtl="0" eaLnBrk="1" latinLnBrk="0" hangingPunct="1">
+              <a:defRPr sz="2100" kern="1200">
+                <a:solidFill>
+                  <a:schemeClr val="tx1"/>
+                </a:solidFill>
+                <a:latin typeface="+mn-lt"/>
+                <a:ea typeface="+mn-ea"/>
+                <a:cs typeface="+mn-cs"/>
+              </a:defRPr>
+            </a:lvl8pPr>
+            <a:lvl9pPr marL="4172224" algn="l" defTabSz="1043056" rtl="0" eaLnBrk="1" latinLnBrk="0" hangingPunct="1">
+              <a:defRPr sz="2100" kern="1200">
+                <a:solidFill>
+                  <a:schemeClr val="tx1"/>
+                </a:solidFill>
+                <a:latin typeface="+mn-lt"/>
+                <a:ea typeface="+mn-ea"/>
+                <a:cs typeface="+mn-cs"/>
+              </a:defRPr>
+            </a:lvl9pPr>
+          </a:lstStyle>
+          <a:p>
+            <a:pPr>
+              <a:defRPr/>
+            </a:pPr>
+            <a:r>
+              <a:rPr lang="pt-BR"/>
+              <a:t>1</a:t>
+            </a:r>
+            <a:endParaRPr lang="pt-BR" sz="880"/>
+          </a:p>
+        </p:txBody>
+      </p:sp>
+      <p:sp>
+        <p:nvSpPr>
+          <p:cNvPr id="14" name="Espaço Reservado para Texto 1">
+            <a:extLst>
+              <a:ext uri="{FF2B5EF4-FFF2-40B4-BE49-F238E27FC236}">
+                <a16:creationId xmlns:a16="http://schemas.microsoft.com/office/drawing/2014/main" id="{866306A9-09F0-4496-BC52-145D163117F3}"/>
+              </a:ext>
+            </a:extLst>
+          </p:cNvPr>
+          <p:cNvSpPr txBox="1">
+            <a:spLocks/>
+          </p:cNvSpPr>
+          <p:nvPr/>
+        </p:nvSpPr>
+        <p:spPr>
+          <a:xfrm>
+            <a:off x="610094" y="1109608"/>
+            <a:ext cx="12448085" cy="3312368"/>
+          </a:xfrm>
+          <a:prstGeom prst="rect">
+            <a:avLst/>
+          </a:prstGeom>
+        </p:spPr>
+        <p:txBody>
+          <a:bodyPr/>
+          <a:lstStyle>
+            <a:lvl1pPr marL="431080" indent="-431080" algn="l" defTabSz="1149545" rtl="0" eaLnBrk="1" latinLnBrk="0" hangingPunct="1">
+              <a:spcBef>
+                <a:spcPct val="20000"/>
+              </a:spcBef>
+              <a:buFont typeface="Arial" pitchFamily="34" charset="0"/>
+              <a:buChar char="•"/>
+              <a:defRPr sz="4023" kern="1200">
+                <a:solidFill>
+                  <a:schemeClr val="tx1"/>
+                </a:solidFill>
+                <a:latin typeface="+mn-lt"/>
+                <a:ea typeface="+mn-ea"/>
+                <a:cs typeface="+mn-cs"/>
+              </a:defRPr>
+            </a:lvl1pPr>
+            <a:lvl2pPr marL="934005" indent="-359233" algn="l" defTabSz="1149545" rtl="0" eaLnBrk="1" latinLnBrk="0" hangingPunct="1">
+              <a:spcBef>
+                <a:spcPct val="20000"/>
+              </a:spcBef>
+              <a:buFont typeface="Arial" pitchFamily="34" charset="0"/>
+              <a:buChar char="–"/>
+              <a:defRPr sz="3520" kern="1200">
+                <a:solidFill>
+                  <a:schemeClr val="tx1"/>
+                </a:solidFill>
+                <a:latin typeface="+mn-lt"/>
+                <a:ea typeface="+mn-ea"/>
+                <a:cs typeface="+mn-cs"/>
+              </a:defRPr>
+            </a:lvl2pPr>
+            <a:lvl3pPr marL="1436931" indent="-287386" algn="l" defTabSz="1149545" rtl="0" eaLnBrk="1" latinLnBrk="0" hangingPunct="1">
+              <a:spcBef>
+                <a:spcPct val="20000"/>
+              </a:spcBef>
+              <a:buFont typeface="Arial" pitchFamily="34" charset="0"/>
+              <a:buChar char="•"/>
+              <a:defRPr sz="3017" kern="1200">
+                <a:solidFill>
+                  <a:schemeClr val="tx1"/>
+                </a:solidFill>
+                <a:latin typeface="+mn-lt"/>
+                <a:ea typeface="+mn-ea"/>
+                <a:cs typeface="+mn-cs"/>
+              </a:defRPr>
+            </a:lvl3pPr>
+            <a:lvl4pPr marL="2011704" indent="-287386" algn="l" defTabSz="1149545" rtl="0" eaLnBrk="1" latinLnBrk="0" hangingPunct="1">
+              <a:spcBef>
+                <a:spcPct val="20000"/>
+              </a:spcBef>
+              <a:buFont typeface="Arial" pitchFamily="34" charset="0"/>
+              <a:buChar char="–"/>
+              <a:defRPr sz="2514" kern="1200">
+                <a:solidFill>
+                  <a:schemeClr val="tx1"/>
+                </a:solidFill>
+                <a:latin typeface="+mn-lt"/>
+                <a:ea typeface="+mn-ea"/>
+                <a:cs typeface="+mn-cs"/>
+              </a:defRPr>
+            </a:lvl4pPr>
+            <a:lvl5pPr marL="2586478" indent="-287386" algn="l" defTabSz="1149545" rtl="0" eaLnBrk="1" latinLnBrk="0" hangingPunct="1">
+              <a:spcBef>
+                <a:spcPct val="20000"/>
+              </a:spcBef>
+              <a:buFont typeface="Arial" pitchFamily="34" charset="0"/>
+              <a:buChar char="»"/>
+              <a:defRPr sz="2514" kern="1200">
+                <a:solidFill>
+                  <a:schemeClr val="tx1"/>
+                </a:solidFill>
+                <a:latin typeface="+mn-lt"/>
+                <a:ea typeface="+mn-ea"/>
+                <a:cs typeface="+mn-cs"/>
+              </a:defRPr>
+            </a:lvl5pPr>
+            <a:lvl6pPr marL="3161249" indent="-287386" algn="l" defTabSz="1149545" rtl="0" eaLnBrk="1" latinLnBrk="0" hangingPunct="1">
+              <a:spcBef>
+                <a:spcPct val="20000"/>
+              </a:spcBef>
+              <a:buFont typeface="Arial" pitchFamily="34" charset="0"/>
+              <a:buChar char="•"/>
+              <a:defRPr sz="2514" kern="1200">
+                <a:solidFill>
+                  <a:schemeClr val="tx1"/>
+                </a:solidFill>
+                <a:latin typeface="+mn-lt"/>
+                <a:ea typeface="+mn-ea"/>
+                <a:cs typeface="+mn-cs"/>
+              </a:defRPr>
+            </a:lvl6pPr>
+            <a:lvl7pPr marL="3736023" indent="-287386" algn="l" defTabSz="1149545" rtl="0" eaLnBrk="1" latinLnBrk="0" hangingPunct="1">
+              <a:spcBef>
+                <a:spcPct val="20000"/>
+              </a:spcBef>
+              <a:buFont typeface="Arial" pitchFamily="34" charset="0"/>
+              <a:buChar char="•"/>
+              <a:defRPr sz="2514" kern="1200">
+                <a:solidFill>
+                  <a:schemeClr val="tx1"/>
+                </a:solidFill>
+                <a:latin typeface="+mn-lt"/>
+                <a:ea typeface="+mn-ea"/>
+                <a:cs typeface="+mn-cs"/>
+              </a:defRPr>
+            </a:lvl7pPr>
+            <a:lvl8pPr marL="4310795" indent="-287386" algn="l" defTabSz="1149545" rtl="0" eaLnBrk="1" latinLnBrk="0" hangingPunct="1">
+              <a:spcBef>
+                <a:spcPct val="20000"/>
+              </a:spcBef>
+              <a:buFont typeface="Arial" pitchFamily="34" charset="0"/>
+              <a:buChar char="•"/>
+              <a:defRPr sz="2514" kern="1200">
+                <a:solidFill>
+                  <a:schemeClr val="tx1"/>
+                </a:solidFill>
+                <a:latin typeface="+mn-lt"/>
+                <a:ea typeface="+mn-ea"/>
+                <a:cs typeface="+mn-cs"/>
+              </a:defRPr>
+            </a:lvl8pPr>
+            <a:lvl9pPr marL="4885567" indent="-287386" algn="l" defTabSz="1149545" rtl="0" eaLnBrk="1" latinLnBrk="0" hangingPunct="1">
+              <a:spcBef>
+                <a:spcPct val="20000"/>
+              </a:spcBef>
+              <a:buFont typeface="Arial" pitchFamily="34" charset="0"/>
+              <a:buChar char="•"/>
+              <a:defRPr sz="2514" kern="1200">
+                <a:solidFill>
+                  <a:schemeClr val="tx1"/>
+                </a:solidFill>
+                <a:latin typeface="+mn-lt"/>
+                <a:ea typeface="+mn-ea"/>
+                <a:cs typeface="+mn-cs"/>
+              </a:defRPr>
+            </a:lvl9pPr>
+          </a:lstStyle>
+          <a:p>
+            <a:pPr lvl="1"/>
+            <a:endParaRPr lang="pt-BR" sz="3200" dirty="0"/>
+          </a:p>
+        </p:txBody>
+      </p:sp>
+      <p:sp>
+        <p:nvSpPr>
+          <p:cNvPr id="15" name="CaixaDeTexto 14">
+            <a:extLst>
+              <a:ext uri="{FF2B5EF4-FFF2-40B4-BE49-F238E27FC236}">
+                <a16:creationId xmlns:a16="http://schemas.microsoft.com/office/drawing/2014/main" id="{D0938F08-93F6-4EE8-AF9A-BBAD4BA0633F}"/>
+              </a:ext>
+            </a:extLst>
+          </p:cNvPr>
+          <p:cNvSpPr txBox="1"/>
+          <p:nvPr/>
+        </p:nvSpPr>
+        <p:spPr>
+          <a:xfrm>
+            <a:off x="1550020" y="1962615"/>
+            <a:ext cx="9891131" cy="1384995"/>
+          </a:xfrm>
+          <a:prstGeom prst="rect">
+            <a:avLst/>
+          </a:prstGeom>
+          <a:noFill/>
+        </p:spPr>
+        <p:txBody>
+          <a:bodyPr wrap="square" rtlCol="0">
+            <a:spAutoFit/>
+          </a:bodyPr>
+          <a:lstStyle/>
+          <a:p>
+            <a:r>
+              <a:rPr lang="pt-BR" dirty="0"/>
+              <a:t>- Pesquisamos entre atletas, a visão que eles tinham sobre o mercado de quadras e o que eles achavam que poderia melhorar para que fosse mais fácil para que ele se reunisse e achasse pessoas afim de com ele, praticar o seu esporte favorito. Com esses fatores levantados nos produzimos o </a:t>
+            </a:r>
+            <a:r>
+              <a:rPr lang="pt-BR" dirty="0" err="1"/>
+              <a:t>protopersona</a:t>
+            </a:r>
+            <a:r>
+              <a:rPr lang="pt-BR" dirty="0"/>
+              <a:t>.</a:t>
+            </a:r>
+          </a:p>
+        </p:txBody>
+      </p:sp>
+    </p:spTree>
+    <p:extLst>
+      <p:ext uri="{BB962C8B-B14F-4D97-AF65-F5344CB8AC3E}">
+        <p14:creationId xmlns:p14="http://schemas.microsoft.com/office/powerpoint/2010/main" val="973429435"/>
+      </p:ext>
+    </p:extLst>
+  </p:cSld>
+  <p:clrMapOvr>
+    <a:masterClrMapping/>
+  </p:clrMapOvr>
+  <p:timing>
+    <p:tnLst>
+      <p:par>
+        <p:cTn id="1" dur="indefinite" restart="never" nodeType="tmRoot">
+          <p:childTnLst>
+            <p:seq concurrent="1" nextAc="seek">
+              <p:cTn id="2" dur="indefinite" nodeType="mainSeq">
+                <p:childTnLst>
+                  <p:par>
+                    <p:cTn id="3" fill="hold">
+                      <p:stCondLst>
+                        <p:cond delay="indefinite"/>
+                      </p:stCondLst>
+                      <p:childTnLst>
+                        <p:par>
+                          <p:cTn id="4" fill="hold">
+                            <p:stCondLst>
+                              <p:cond delay="0"/>
+                            </p:stCondLst>
+                            <p:childTnLst>
+                              <p:par>
+                                <p:cTn id="5" presetID="1" presetClass="entr" presetSubtype="0" fill="hold" grpId="0" nodeType="clickEffect" nodePh="1">
+                                  <p:stCondLst>
+                                    <p:cond delay="0"/>
+                                  </p:stCondLst>
+                                  <p:endCondLst>
+                                    <p:cond evt="begin" delay="0">
+                                      <p:tn val="5"/>
+                                    </p:cond>
+                                  </p:endCondLst>
+                                  <p:childTnLst>
+                                    <p:set>
+                                      <p:cBhvr>
+                                        <p:cTn id="6" dur="1" fill="hold">
+                                          <p:stCondLst>
+                                            <p:cond delay="0"/>
+                                          </p:stCondLst>
+                                        </p:cTn>
+                                        <p:tgtEl>
+                                          <p:spTgt spid="14">
+                                            <p:txEl>
+                                              <p:pRg st="0" end="0"/>
+                                            </p:txEl>
+                                          </p:spTgt>
+                                        </p:tgtEl>
+                                        <p:attrNameLst>
+                                          <p:attrName>style.visibility</p:attrName>
+                                        </p:attrNameLst>
+                                      </p:cBhvr>
+                                      <p:to>
+                                        <p:strVal val="visible"/>
+                                      </p:to>
+                                    </p:set>
+                                  </p:childTnLst>
+                                </p:cTn>
+                              </p:par>
+                            </p:childTnLst>
+                          </p:cTn>
+                        </p:par>
+                      </p:childTnLst>
+                    </p:cTn>
+                  </p:par>
+                </p:childTnLst>
+              </p:cTn>
+              <p:prevCondLst>
+                <p:cond evt="onPrev" delay="0">
+                  <p:tgtEl>
+                    <p:sldTgt/>
+                  </p:tgtEl>
+                </p:cond>
+              </p:prevCondLst>
+              <p:nextCondLst>
+                <p:cond evt="onNext" delay="0">
+                  <p:tgtEl>
+                    <p:sldTgt/>
+                  </p:tgtEl>
+                </p:cond>
+              </p:nextCondLst>
+            </p:seq>
+          </p:childTnLst>
+        </p:cTn>
+      </p:par>
+    </p:tnLst>
+    <p:bldLst>
+      <p:bldP spid="14" grpId="0" build="p"/>
+    </p:bldLst>
+  </p:timing>
+</p:sld>
+</file>
+
+<file path=ppt/slides/slide7.xml><?xml version="1.0" encoding="utf-8"?>
 <p:sld xmlns:a="http://schemas.openxmlformats.org/drawingml/2006/main" xmlns:r="http://schemas.openxmlformats.org/officeDocument/2006/relationships" xmlns:p="http://schemas.openxmlformats.org/presentationml/2006/main">
   <p:cSld>
     <p:spTree>
@@ -9980,7 +12069,7 @@
               <a:pPr>
                 <a:defRPr/>
               </a:pPr>
-              <a:t>4</a:t>
+              <a:t>7</a:t>
             </a:fld>
             <a:endParaRPr lang="pt-BR" sz="880" dirty="0"/>
           </a:p>
@@ -10440,6 +12529,1678 @@
     <p:extLst>
       <p:ext uri="{BB962C8B-B14F-4D97-AF65-F5344CB8AC3E}">
         <p14:creationId xmlns:p14="http://schemas.microsoft.com/office/powerpoint/2010/main" val="446769231"/>
+      </p:ext>
+    </p:extLst>
+  </p:cSld>
+  <p:clrMapOvr>
+    <a:masterClrMapping/>
+  </p:clrMapOvr>
+</p:sld>
+</file>
+
+<file path=ppt/slides/slide8.xml><?xml version="1.0" encoding="utf-8"?>
+<p:sld xmlns:a="http://schemas.openxmlformats.org/drawingml/2006/main" xmlns:r="http://schemas.openxmlformats.org/officeDocument/2006/relationships" xmlns:p="http://schemas.openxmlformats.org/presentationml/2006/main">
+  <p:cSld>
+    <p:spTree>
+      <p:nvGrpSpPr>
+        <p:cNvPr id="1" name=""/>
+        <p:cNvGrpSpPr/>
+        <p:nvPr/>
+      </p:nvGrpSpPr>
+      <p:grpSpPr>
+        <a:xfrm>
+          <a:off x="0" y="0"/>
+          <a:ext cx="0" cy="0"/>
+          <a:chOff x="0" y="0"/>
+          <a:chExt cx="0" cy="0"/>
+        </a:xfrm>
+      </p:grpSpPr>
+      <p:sp>
+        <p:nvSpPr>
+          <p:cNvPr id="8" name="Espaço Reservado para Número de Slide 7">
+            <a:extLst>
+              <a:ext uri="{FF2B5EF4-FFF2-40B4-BE49-F238E27FC236}">
+                <a16:creationId xmlns:a16="http://schemas.microsoft.com/office/drawing/2014/main" id="{CFE53A82-8ACF-4202-BA3C-2C25C9C617CB}"/>
+              </a:ext>
+            </a:extLst>
+          </p:cNvPr>
+          <p:cNvSpPr>
+            <a:spLocks noGrp="1"/>
+          </p:cNvSpPr>
+          <p:nvPr>
+            <p:ph type="sldNum" sz="quarter" idx="15"/>
+          </p:nvPr>
+        </p:nvSpPr>
+        <p:spPr/>
+        <p:txBody>
+          <a:bodyPr/>
+          <a:lstStyle/>
+          <a:p>
+            <a:pPr>
+              <a:defRPr/>
+            </a:pPr>
+            <a:fld id="{B66251D2-9488-44CD-87B4-F793A73C4A01}" type="slidenum">
+              <a:rPr lang="pt-BR" smtClean="0"/>
+              <a:pPr>
+                <a:defRPr/>
+              </a:pPr>
+              <a:t>8</a:t>
+            </a:fld>
+            <a:endParaRPr lang="pt-BR" sz="880"/>
+          </a:p>
+        </p:txBody>
+      </p:sp>
+      <p:sp>
+        <p:nvSpPr>
+          <p:cNvPr id="9" name="Espaço Reservado para Número de Slide 2">
+            <a:extLst>
+              <a:ext uri="{FF2B5EF4-FFF2-40B4-BE49-F238E27FC236}">
+                <a16:creationId xmlns:a16="http://schemas.microsoft.com/office/drawing/2014/main" id="{2CE49D37-D9FE-4038-9669-B5C1422645D1}"/>
+              </a:ext>
+            </a:extLst>
+          </p:cNvPr>
+          <p:cNvSpPr txBox="1">
+            <a:spLocks/>
+          </p:cNvSpPr>
+          <p:nvPr/>
+        </p:nvSpPr>
+        <p:spPr>
+          <a:xfrm>
+            <a:off x="12605478" y="7237015"/>
+            <a:ext cx="628646" cy="214290"/>
+          </a:xfrm>
+          <a:prstGeom prst="rect">
+            <a:avLst/>
+          </a:prstGeom>
+        </p:spPr>
+        <p:txBody>
+          <a:bodyPr/>
+          <a:lstStyle>
+            <a:lvl1pPr marL="431080" indent="-431080" algn="l" defTabSz="1149545" rtl="0" eaLnBrk="1" latinLnBrk="0" hangingPunct="1">
+              <a:spcBef>
+                <a:spcPct val="20000"/>
+              </a:spcBef>
+              <a:buFont typeface="Arial" pitchFamily="34" charset="0"/>
+              <a:buChar char="•"/>
+              <a:defRPr sz="3394" kern="1200">
+                <a:solidFill>
+                  <a:schemeClr val="tx1"/>
+                </a:solidFill>
+                <a:latin typeface="Exo 2" pitchFamily="50" charset="0"/>
+                <a:ea typeface="+mn-ea"/>
+                <a:cs typeface="+mn-cs"/>
+              </a:defRPr>
+            </a:lvl1pPr>
+            <a:lvl2pPr marL="934005" indent="-359233" algn="l" defTabSz="1149545" rtl="0" eaLnBrk="1" latinLnBrk="0" hangingPunct="1">
+              <a:spcBef>
+                <a:spcPct val="20000"/>
+              </a:spcBef>
+              <a:buFont typeface="Arial" pitchFamily="34" charset="0"/>
+              <a:buChar char="–"/>
+              <a:defRPr sz="2891" kern="1200">
+                <a:solidFill>
+                  <a:schemeClr val="tx1"/>
+                </a:solidFill>
+                <a:latin typeface="Exo 2" pitchFamily="50" charset="0"/>
+                <a:ea typeface="+mn-ea"/>
+                <a:cs typeface="+mn-cs"/>
+              </a:defRPr>
+            </a:lvl2pPr>
+            <a:lvl3pPr marL="1436931" indent="-287386" algn="l" defTabSz="1149545" rtl="0" eaLnBrk="1" latinLnBrk="0" hangingPunct="1">
+              <a:spcBef>
+                <a:spcPct val="20000"/>
+              </a:spcBef>
+              <a:buFont typeface="Arial" pitchFamily="34" charset="0"/>
+              <a:buChar char="•"/>
+              <a:defRPr sz="2640" kern="1200">
+                <a:solidFill>
+                  <a:schemeClr val="tx1"/>
+                </a:solidFill>
+                <a:latin typeface="Exo 2" pitchFamily="50" charset="0"/>
+                <a:ea typeface="+mn-ea"/>
+                <a:cs typeface="+mn-cs"/>
+              </a:defRPr>
+            </a:lvl3pPr>
+            <a:lvl4pPr marL="2011704" indent="-287386" algn="l" defTabSz="1149545" rtl="0" eaLnBrk="1" latinLnBrk="0" hangingPunct="1">
+              <a:spcBef>
+                <a:spcPct val="20000"/>
+              </a:spcBef>
+              <a:buFont typeface="Arial" pitchFamily="34" charset="0"/>
+              <a:buChar char="–"/>
+              <a:defRPr sz="2263" kern="1200">
+                <a:solidFill>
+                  <a:schemeClr val="tx1"/>
+                </a:solidFill>
+                <a:latin typeface="Exo 2" pitchFamily="50" charset="0"/>
+                <a:ea typeface="+mn-ea"/>
+                <a:cs typeface="+mn-cs"/>
+              </a:defRPr>
+            </a:lvl4pPr>
+            <a:lvl5pPr marL="2586478" indent="-287386" algn="l" defTabSz="1149545" rtl="0" eaLnBrk="1" latinLnBrk="0" hangingPunct="1">
+              <a:spcBef>
+                <a:spcPct val="20000"/>
+              </a:spcBef>
+              <a:buFont typeface="Arial" pitchFamily="34" charset="0"/>
+              <a:buChar char="»"/>
+              <a:defRPr sz="2263" kern="1200">
+                <a:solidFill>
+                  <a:schemeClr val="tx1"/>
+                </a:solidFill>
+                <a:latin typeface="Exo 2" pitchFamily="50" charset="0"/>
+                <a:ea typeface="+mn-ea"/>
+                <a:cs typeface="+mn-cs"/>
+              </a:defRPr>
+            </a:lvl5pPr>
+            <a:lvl6pPr marL="3161249" indent="-287386" algn="l" defTabSz="1149545" rtl="0" eaLnBrk="1" latinLnBrk="0" hangingPunct="1">
+              <a:spcBef>
+                <a:spcPct val="20000"/>
+              </a:spcBef>
+              <a:buFont typeface="Arial" pitchFamily="34" charset="0"/>
+              <a:buChar char="•"/>
+              <a:defRPr sz="2263" kern="1200">
+                <a:solidFill>
+                  <a:schemeClr val="tx1"/>
+                </a:solidFill>
+                <a:latin typeface="+mn-lt"/>
+                <a:ea typeface="+mn-ea"/>
+                <a:cs typeface="+mn-cs"/>
+              </a:defRPr>
+            </a:lvl6pPr>
+            <a:lvl7pPr marL="3736023" indent="-287386" algn="l" defTabSz="1149545" rtl="0" eaLnBrk="1" latinLnBrk="0" hangingPunct="1">
+              <a:spcBef>
+                <a:spcPct val="20000"/>
+              </a:spcBef>
+              <a:buFont typeface="Arial" pitchFamily="34" charset="0"/>
+              <a:buChar char="•"/>
+              <a:defRPr sz="2263" kern="1200">
+                <a:solidFill>
+                  <a:schemeClr val="tx1"/>
+                </a:solidFill>
+                <a:latin typeface="+mn-lt"/>
+                <a:ea typeface="+mn-ea"/>
+                <a:cs typeface="+mn-cs"/>
+              </a:defRPr>
+            </a:lvl7pPr>
+            <a:lvl8pPr marL="4310795" indent="-287386" algn="l" defTabSz="1149545" rtl="0" eaLnBrk="1" latinLnBrk="0" hangingPunct="1">
+              <a:spcBef>
+                <a:spcPct val="20000"/>
+              </a:spcBef>
+              <a:buFont typeface="Arial" pitchFamily="34" charset="0"/>
+              <a:buChar char="•"/>
+              <a:defRPr sz="2263" kern="1200">
+                <a:solidFill>
+                  <a:schemeClr val="tx1"/>
+                </a:solidFill>
+                <a:latin typeface="+mn-lt"/>
+                <a:ea typeface="+mn-ea"/>
+                <a:cs typeface="+mn-cs"/>
+              </a:defRPr>
+            </a:lvl8pPr>
+            <a:lvl9pPr marL="4885567" indent="-287386" algn="l" defTabSz="1149545" rtl="0" eaLnBrk="1" latinLnBrk="0" hangingPunct="1">
+              <a:spcBef>
+                <a:spcPct val="20000"/>
+              </a:spcBef>
+              <a:buFont typeface="Arial" pitchFamily="34" charset="0"/>
+              <a:buChar char="•"/>
+              <a:defRPr sz="2263" kern="1200">
+                <a:solidFill>
+                  <a:schemeClr val="tx1"/>
+                </a:solidFill>
+                <a:latin typeface="+mn-lt"/>
+                <a:ea typeface="+mn-ea"/>
+                <a:cs typeface="+mn-cs"/>
+              </a:defRPr>
+            </a:lvl9pPr>
+          </a:lstStyle>
+          <a:p>
+            <a:pPr>
+              <a:defRPr/>
+            </a:pPr>
+            <a:fld id="{B66251D2-9488-44CD-87B4-F793A73C4A01}" type="slidenum">
+              <a:rPr lang="pt-BR" smtClean="0"/>
+              <a:pPr>
+                <a:defRPr/>
+              </a:pPr>
+              <a:t>8</a:t>
+            </a:fld>
+            <a:endParaRPr lang="pt-BR" sz="880" dirty="0"/>
+          </a:p>
+        </p:txBody>
+      </p:sp>
+      <p:sp>
+        <p:nvSpPr>
+          <p:cNvPr id="10" name="Espaço Reservado para Texto 3">
+            <a:extLst>
+              <a:ext uri="{FF2B5EF4-FFF2-40B4-BE49-F238E27FC236}">
+                <a16:creationId xmlns:a16="http://schemas.microsoft.com/office/drawing/2014/main" id="{0E67637F-B7E1-42AB-B64A-179FAD44896F}"/>
+              </a:ext>
+            </a:extLst>
+          </p:cNvPr>
+          <p:cNvSpPr txBox="1">
+            <a:spLocks/>
+          </p:cNvSpPr>
+          <p:nvPr/>
+        </p:nvSpPr>
+        <p:spPr>
+          <a:xfrm>
+            <a:off x="2184972" y="108228"/>
+            <a:ext cx="10782599" cy="765639"/>
+          </a:xfrm>
+          <a:prstGeom prst="rect">
+            <a:avLst/>
+          </a:prstGeom>
+        </p:spPr>
+        <p:txBody>
+          <a:bodyPr anchor="t"/>
+          <a:lstStyle>
+            <a:lvl1pPr marL="431080" indent="-431080" algn="l" defTabSz="1149545" rtl="0" eaLnBrk="1" latinLnBrk="0" hangingPunct="1">
+              <a:spcBef>
+                <a:spcPct val="20000"/>
+              </a:spcBef>
+              <a:buFont typeface="Arial" pitchFamily="34" charset="0"/>
+              <a:buNone/>
+              <a:defRPr sz="3771" b="1" kern="1200" baseline="0">
+                <a:solidFill>
+                  <a:srgbClr val="32B9CD"/>
+                </a:solidFill>
+                <a:latin typeface="Exo 2" pitchFamily="50" charset="0"/>
+                <a:ea typeface="+mn-ea"/>
+                <a:cs typeface="+mn-cs"/>
+              </a:defRPr>
+            </a:lvl1pPr>
+            <a:lvl2pPr marL="934005" indent="-359233" algn="l" defTabSz="1149545" rtl="0" eaLnBrk="1" latinLnBrk="0" hangingPunct="1">
+              <a:spcBef>
+                <a:spcPct val="20000"/>
+              </a:spcBef>
+              <a:buFont typeface="Arial" pitchFamily="34" charset="0"/>
+              <a:buNone/>
+              <a:defRPr sz="3771" kern="1200">
+                <a:solidFill>
+                  <a:schemeClr val="tx1"/>
+                </a:solidFill>
+                <a:latin typeface="Exo 2" pitchFamily="50" charset="0"/>
+                <a:ea typeface="+mn-ea"/>
+                <a:cs typeface="+mn-cs"/>
+              </a:defRPr>
+            </a:lvl2pPr>
+            <a:lvl3pPr marL="1436931" indent="-287386" algn="l" defTabSz="1149545" rtl="0" eaLnBrk="1" latinLnBrk="0" hangingPunct="1">
+              <a:spcBef>
+                <a:spcPct val="20000"/>
+              </a:spcBef>
+              <a:buFont typeface="Arial" pitchFamily="34" charset="0"/>
+              <a:buNone/>
+              <a:defRPr sz="3771" kern="1200">
+                <a:solidFill>
+                  <a:schemeClr val="tx1"/>
+                </a:solidFill>
+                <a:latin typeface="Exo 2" pitchFamily="50" charset="0"/>
+                <a:ea typeface="+mn-ea"/>
+                <a:cs typeface="+mn-cs"/>
+              </a:defRPr>
+            </a:lvl3pPr>
+            <a:lvl4pPr marL="2011704" indent="-287386" algn="l" defTabSz="1149545" rtl="0" eaLnBrk="1" latinLnBrk="0" hangingPunct="1">
+              <a:spcBef>
+                <a:spcPct val="20000"/>
+              </a:spcBef>
+              <a:buFont typeface="Arial" pitchFamily="34" charset="0"/>
+              <a:buNone/>
+              <a:defRPr sz="3771" kern="1200">
+                <a:solidFill>
+                  <a:schemeClr val="tx1"/>
+                </a:solidFill>
+                <a:latin typeface="Exo 2" pitchFamily="50" charset="0"/>
+                <a:ea typeface="+mn-ea"/>
+                <a:cs typeface="+mn-cs"/>
+              </a:defRPr>
+            </a:lvl4pPr>
+            <a:lvl5pPr marL="2586478" indent="-287386" algn="l" defTabSz="1149545" rtl="0" eaLnBrk="1" latinLnBrk="0" hangingPunct="1">
+              <a:spcBef>
+                <a:spcPct val="20000"/>
+              </a:spcBef>
+              <a:buFont typeface="Arial" pitchFamily="34" charset="0"/>
+              <a:buNone/>
+              <a:defRPr sz="3771" kern="1200">
+                <a:solidFill>
+                  <a:schemeClr val="tx1"/>
+                </a:solidFill>
+                <a:latin typeface="Exo 2" pitchFamily="50" charset="0"/>
+                <a:ea typeface="+mn-ea"/>
+                <a:cs typeface="+mn-cs"/>
+              </a:defRPr>
+            </a:lvl5pPr>
+            <a:lvl6pPr marL="3161249" indent="-287386" algn="l" defTabSz="1149545" rtl="0" eaLnBrk="1" latinLnBrk="0" hangingPunct="1">
+              <a:spcBef>
+                <a:spcPct val="20000"/>
+              </a:spcBef>
+              <a:buFont typeface="Arial" pitchFamily="34" charset="0"/>
+              <a:buChar char="•"/>
+              <a:defRPr sz="2514" kern="1200">
+                <a:solidFill>
+                  <a:schemeClr val="tx1"/>
+                </a:solidFill>
+                <a:latin typeface="+mn-lt"/>
+                <a:ea typeface="+mn-ea"/>
+                <a:cs typeface="+mn-cs"/>
+              </a:defRPr>
+            </a:lvl6pPr>
+            <a:lvl7pPr marL="3736023" indent="-287386" algn="l" defTabSz="1149545" rtl="0" eaLnBrk="1" latinLnBrk="0" hangingPunct="1">
+              <a:spcBef>
+                <a:spcPct val="20000"/>
+              </a:spcBef>
+              <a:buFont typeface="Arial" pitchFamily="34" charset="0"/>
+              <a:buChar char="•"/>
+              <a:defRPr sz="2514" kern="1200">
+                <a:solidFill>
+                  <a:schemeClr val="tx1"/>
+                </a:solidFill>
+                <a:latin typeface="+mn-lt"/>
+                <a:ea typeface="+mn-ea"/>
+                <a:cs typeface="+mn-cs"/>
+              </a:defRPr>
+            </a:lvl7pPr>
+            <a:lvl8pPr marL="4310795" indent="-287386" algn="l" defTabSz="1149545" rtl="0" eaLnBrk="1" latinLnBrk="0" hangingPunct="1">
+              <a:spcBef>
+                <a:spcPct val="20000"/>
+              </a:spcBef>
+              <a:buFont typeface="Arial" pitchFamily="34" charset="0"/>
+              <a:buChar char="•"/>
+              <a:defRPr sz="2514" kern="1200">
+                <a:solidFill>
+                  <a:schemeClr val="tx1"/>
+                </a:solidFill>
+                <a:latin typeface="+mn-lt"/>
+                <a:ea typeface="+mn-ea"/>
+                <a:cs typeface="+mn-cs"/>
+              </a:defRPr>
+            </a:lvl8pPr>
+            <a:lvl9pPr marL="4885567" indent="-287386" algn="l" defTabSz="1149545" rtl="0" eaLnBrk="1" latinLnBrk="0" hangingPunct="1">
+              <a:spcBef>
+                <a:spcPct val="20000"/>
+              </a:spcBef>
+              <a:buFont typeface="Arial" pitchFamily="34" charset="0"/>
+              <a:buChar char="•"/>
+              <a:defRPr sz="2514" kern="1200">
+                <a:solidFill>
+                  <a:schemeClr val="tx1"/>
+                </a:solidFill>
+                <a:latin typeface="+mn-lt"/>
+                <a:ea typeface="+mn-ea"/>
+                <a:cs typeface="+mn-cs"/>
+              </a:defRPr>
+            </a:lvl9pPr>
+          </a:lstStyle>
+          <a:p>
+            <a:r>
+              <a:rPr lang="pt-BR"/>
+              <a:t>5. Jornada – Simplificada</a:t>
+            </a:r>
+            <a:endParaRPr lang="pt-BR" dirty="0"/>
+          </a:p>
+        </p:txBody>
+      </p:sp>
+      <p:sp>
+        <p:nvSpPr>
+          <p:cNvPr id="11" name="Seta: Pentágono 10">
+            <a:extLst>
+              <a:ext uri="{FF2B5EF4-FFF2-40B4-BE49-F238E27FC236}">
+                <a16:creationId xmlns:a16="http://schemas.microsoft.com/office/drawing/2014/main" id="{CA8C69C4-9044-4085-927B-502318E4ACD6}"/>
+              </a:ext>
+            </a:extLst>
+          </p:cNvPr>
+          <p:cNvSpPr/>
+          <p:nvPr/>
+        </p:nvSpPr>
+        <p:spPr>
+          <a:xfrm>
+            <a:off x="2630901" y="1339514"/>
+            <a:ext cx="2518611" cy="625642"/>
+          </a:xfrm>
+          <a:prstGeom prst="homePlate">
+            <a:avLst/>
+          </a:prstGeom>
+          <a:solidFill>
+            <a:srgbClr val="32B9CD"/>
+          </a:solidFill>
+          <a:ln>
+            <a:noFill/>
+          </a:ln>
+        </p:spPr>
+        <p:style>
+          <a:lnRef idx="2">
+            <a:schemeClr val="accent1">
+              <a:shade val="50000"/>
+            </a:schemeClr>
+          </a:lnRef>
+          <a:fillRef idx="1">
+            <a:schemeClr val="accent1"/>
+          </a:fillRef>
+          <a:effectRef idx="0">
+            <a:schemeClr val="accent1"/>
+          </a:effectRef>
+          <a:fontRef idx="minor">
+            <a:schemeClr val="lt1"/>
+          </a:fontRef>
+        </p:style>
+        <p:txBody>
+          <a:bodyPr rtlCol="0" anchor="ctr"/>
+          <a:lstStyle/>
+          <a:p>
+            <a:pPr algn="ctr"/>
+            <a:r>
+              <a:rPr lang="pt-BR" dirty="0"/>
+              <a:t>FASES UTILIZADOR</a:t>
+            </a:r>
+          </a:p>
+        </p:txBody>
+      </p:sp>
+      <p:sp>
+        <p:nvSpPr>
+          <p:cNvPr id="12" name="Seta: Pentágono 11">
+            <a:extLst>
+              <a:ext uri="{FF2B5EF4-FFF2-40B4-BE49-F238E27FC236}">
+                <a16:creationId xmlns:a16="http://schemas.microsoft.com/office/drawing/2014/main" id="{9A93E3DB-C8AF-4DB0-AE4B-B3FEA17A2AE7}"/>
+              </a:ext>
+            </a:extLst>
+          </p:cNvPr>
+          <p:cNvSpPr/>
+          <p:nvPr/>
+        </p:nvSpPr>
+        <p:spPr>
+          <a:xfrm>
+            <a:off x="5149512" y="1339514"/>
+            <a:ext cx="2518611" cy="625642"/>
+          </a:xfrm>
+          <a:prstGeom prst="homePlate">
+            <a:avLst/>
+          </a:prstGeom>
+          <a:solidFill>
+            <a:srgbClr val="32B9CD"/>
+          </a:solidFill>
+          <a:ln>
+            <a:noFill/>
+          </a:ln>
+        </p:spPr>
+        <p:style>
+          <a:lnRef idx="2">
+            <a:schemeClr val="accent1">
+              <a:shade val="50000"/>
+            </a:schemeClr>
+          </a:lnRef>
+          <a:fillRef idx="1">
+            <a:schemeClr val="accent1"/>
+          </a:fillRef>
+          <a:effectRef idx="0">
+            <a:schemeClr val="accent1"/>
+          </a:effectRef>
+          <a:fontRef idx="minor">
+            <a:schemeClr val="lt1"/>
+          </a:fontRef>
+        </p:style>
+        <p:txBody>
+          <a:bodyPr rtlCol="0" anchor="ctr"/>
+          <a:lstStyle/>
+          <a:p>
+            <a:pPr algn="ctr"/>
+            <a:r>
+              <a:rPr lang="pt-BR" dirty="0"/>
+              <a:t>FASES UTILIZADOR</a:t>
+            </a:r>
+          </a:p>
+        </p:txBody>
+      </p:sp>
+      <p:sp>
+        <p:nvSpPr>
+          <p:cNvPr id="13" name="Seta: Pentágono 12">
+            <a:extLst>
+              <a:ext uri="{FF2B5EF4-FFF2-40B4-BE49-F238E27FC236}">
+                <a16:creationId xmlns:a16="http://schemas.microsoft.com/office/drawing/2014/main" id="{7CCD00FA-A9D6-4B11-AD64-A5D3921D2B2D}"/>
+              </a:ext>
+            </a:extLst>
+          </p:cNvPr>
+          <p:cNvSpPr/>
+          <p:nvPr/>
+        </p:nvSpPr>
+        <p:spPr>
+          <a:xfrm>
+            <a:off x="7712628" y="1339514"/>
+            <a:ext cx="2518611" cy="625642"/>
+          </a:xfrm>
+          <a:prstGeom prst="homePlate">
+            <a:avLst/>
+          </a:prstGeom>
+          <a:solidFill>
+            <a:srgbClr val="32B9CD"/>
+          </a:solidFill>
+          <a:ln>
+            <a:noFill/>
+          </a:ln>
+        </p:spPr>
+        <p:style>
+          <a:lnRef idx="2">
+            <a:schemeClr val="accent1">
+              <a:shade val="50000"/>
+            </a:schemeClr>
+          </a:lnRef>
+          <a:fillRef idx="1">
+            <a:schemeClr val="accent1"/>
+          </a:fillRef>
+          <a:effectRef idx="0">
+            <a:schemeClr val="accent1"/>
+          </a:effectRef>
+          <a:fontRef idx="minor">
+            <a:schemeClr val="lt1"/>
+          </a:fontRef>
+        </p:style>
+        <p:txBody>
+          <a:bodyPr rtlCol="0" anchor="ctr"/>
+          <a:lstStyle/>
+          <a:p>
+            <a:pPr algn="ctr"/>
+            <a:r>
+              <a:rPr lang="pt-BR" dirty="0"/>
+              <a:t>FASES UTILIZADOR</a:t>
+            </a:r>
+          </a:p>
+        </p:txBody>
+      </p:sp>
+      <p:sp>
+        <p:nvSpPr>
+          <p:cNvPr id="14" name="Seta: Pentágono 13">
+            <a:extLst>
+              <a:ext uri="{FF2B5EF4-FFF2-40B4-BE49-F238E27FC236}">
+                <a16:creationId xmlns:a16="http://schemas.microsoft.com/office/drawing/2014/main" id="{F05032B5-8C61-45FD-9A08-B9A6C839F6DC}"/>
+              </a:ext>
+            </a:extLst>
+          </p:cNvPr>
+          <p:cNvSpPr/>
+          <p:nvPr/>
+        </p:nvSpPr>
+        <p:spPr>
+          <a:xfrm>
+            <a:off x="10319471" y="1339514"/>
+            <a:ext cx="2518611" cy="625642"/>
+          </a:xfrm>
+          <a:prstGeom prst="homePlate">
+            <a:avLst/>
+          </a:prstGeom>
+          <a:solidFill>
+            <a:srgbClr val="32B9CD"/>
+          </a:solidFill>
+          <a:ln>
+            <a:noFill/>
+          </a:ln>
+        </p:spPr>
+        <p:style>
+          <a:lnRef idx="2">
+            <a:schemeClr val="accent1">
+              <a:shade val="50000"/>
+            </a:schemeClr>
+          </a:lnRef>
+          <a:fillRef idx="1">
+            <a:schemeClr val="accent1"/>
+          </a:fillRef>
+          <a:effectRef idx="0">
+            <a:schemeClr val="accent1"/>
+          </a:effectRef>
+          <a:fontRef idx="minor">
+            <a:schemeClr val="lt1"/>
+          </a:fontRef>
+        </p:style>
+        <p:txBody>
+          <a:bodyPr rtlCol="0" anchor="ctr"/>
+          <a:lstStyle/>
+          <a:p>
+            <a:pPr algn="ctr"/>
+            <a:r>
+              <a:rPr lang="pt-BR" dirty="0"/>
+              <a:t>FASES UTILIZADOR</a:t>
+            </a:r>
+          </a:p>
+        </p:txBody>
+      </p:sp>
+      <p:cxnSp>
+        <p:nvCxnSpPr>
+          <p:cNvPr id="15" name="Conector reto 14">
+            <a:extLst>
+              <a:ext uri="{FF2B5EF4-FFF2-40B4-BE49-F238E27FC236}">
+                <a16:creationId xmlns:a16="http://schemas.microsoft.com/office/drawing/2014/main" id="{39C27B4A-690F-4E16-883F-A203D70371DD}"/>
+              </a:ext>
+            </a:extLst>
+          </p:cNvPr>
+          <p:cNvCxnSpPr/>
+          <p:nvPr/>
+        </p:nvCxnSpPr>
+        <p:spPr>
+          <a:xfrm>
+            <a:off x="248653" y="2106706"/>
+            <a:ext cx="12744000" cy="0"/>
+          </a:xfrm>
+          <a:prstGeom prst="line">
+            <a:avLst/>
+          </a:prstGeom>
+          <a:ln>
+            <a:solidFill>
+              <a:srgbClr val="32B9CD"/>
+            </a:solidFill>
+          </a:ln>
+        </p:spPr>
+        <p:style>
+          <a:lnRef idx="1">
+            <a:schemeClr val="accent1"/>
+          </a:lnRef>
+          <a:fillRef idx="0">
+            <a:schemeClr val="accent1"/>
+          </a:fillRef>
+          <a:effectRef idx="0">
+            <a:schemeClr val="accent1"/>
+          </a:effectRef>
+          <a:fontRef idx="minor">
+            <a:schemeClr val="tx1"/>
+          </a:fontRef>
+        </p:style>
+      </p:cxnSp>
+      <p:sp>
+        <p:nvSpPr>
+          <p:cNvPr id="16" name="Retângulo 15">
+            <a:extLst>
+              <a:ext uri="{FF2B5EF4-FFF2-40B4-BE49-F238E27FC236}">
+                <a16:creationId xmlns:a16="http://schemas.microsoft.com/office/drawing/2014/main" id="{D4FAD00E-A92B-425B-94D0-1FEAF97C0292}"/>
+              </a:ext>
+            </a:extLst>
+          </p:cNvPr>
+          <p:cNvSpPr/>
+          <p:nvPr/>
+        </p:nvSpPr>
+        <p:spPr>
+          <a:xfrm>
+            <a:off x="2630901" y="2163934"/>
+            <a:ext cx="2037351" cy="369332"/>
+          </a:xfrm>
+          <a:prstGeom prst="rect">
+            <a:avLst/>
+          </a:prstGeom>
+        </p:spPr>
+        <p:txBody>
+          <a:bodyPr wrap="square">
+            <a:spAutoFit/>
+          </a:bodyPr>
+          <a:lstStyle/>
+          <a:p>
+            <a:pPr marL="342900" indent="-342900">
+              <a:buFont typeface="Arial" panose="020B0604020202020204" pitchFamily="34" charset="0"/>
+              <a:buChar char="•"/>
+            </a:pPr>
+            <a:r>
+              <a:rPr lang="pt-BR" sz="1800" dirty="0">
+                <a:latin typeface="Exo 2" panose="00000500000000000000" pitchFamily="50" charset="0"/>
+              </a:rPr>
+              <a:t>Entra no site</a:t>
+            </a:r>
+          </a:p>
+        </p:txBody>
+      </p:sp>
+      <p:cxnSp>
+        <p:nvCxnSpPr>
+          <p:cNvPr id="17" name="Conector reto 16">
+            <a:extLst>
+              <a:ext uri="{FF2B5EF4-FFF2-40B4-BE49-F238E27FC236}">
+                <a16:creationId xmlns:a16="http://schemas.microsoft.com/office/drawing/2014/main" id="{50804D8E-AED3-4C7A-91E2-EB2E5E0BF306}"/>
+              </a:ext>
+            </a:extLst>
+          </p:cNvPr>
+          <p:cNvCxnSpPr/>
+          <p:nvPr/>
+        </p:nvCxnSpPr>
+        <p:spPr>
+          <a:xfrm>
+            <a:off x="248653" y="3205592"/>
+            <a:ext cx="12744000" cy="0"/>
+          </a:xfrm>
+          <a:prstGeom prst="line">
+            <a:avLst/>
+          </a:prstGeom>
+          <a:ln>
+            <a:solidFill>
+              <a:srgbClr val="32B9CD"/>
+            </a:solidFill>
+          </a:ln>
+        </p:spPr>
+        <p:style>
+          <a:lnRef idx="1">
+            <a:schemeClr val="accent1"/>
+          </a:lnRef>
+          <a:fillRef idx="0">
+            <a:schemeClr val="accent1"/>
+          </a:fillRef>
+          <a:effectRef idx="0">
+            <a:schemeClr val="accent1"/>
+          </a:effectRef>
+          <a:fontRef idx="minor">
+            <a:schemeClr val="tx1"/>
+          </a:fontRef>
+        </p:style>
+      </p:cxnSp>
+      <p:sp>
+        <p:nvSpPr>
+          <p:cNvPr id="18" name="Retângulo 17">
+            <a:extLst>
+              <a:ext uri="{FF2B5EF4-FFF2-40B4-BE49-F238E27FC236}">
+                <a16:creationId xmlns:a16="http://schemas.microsoft.com/office/drawing/2014/main" id="{C3844F65-E640-4943-94E1-776857AB47CB}"/>
+              </a:ext>
+            </a:extLst>
+          </p:cNvPr>
+          <p:cNvSpPr/>
+          <p:nvPr/>
+        </p:nvSpPr>
+        <p:spPr>
+          <a:xfrm>
+            <a:off x="248653" y="1283364"/>
+            <a:ext cx="2184972" cy="769441"/>
+          </a:xfrm>
+          <a:prstGeom prst="rect">
+            <a:avLst/>
+          </a:prstGeom>
+        </p:spPr>
+        <p:txBody>
+          <a:bodyPr wrap="square">
+            <a:spAutoFit/>
+          </a:bodyPr>
+          <a:lstStyle/>
+          <a:p>
+            <a:r>
+              <a:rPr lang="pt-BR" sz="2800" b="1" dirty="0">
+                <a:solidFill>
+                  <a:srgbClr val="E6005A"/>
+                </a:solidFill>
+                <a:latin typeface="Exo 2" panose="00000500000000000000" pitchFamily="50" charset="0"/>
+              </a:rPr>
+              <a:t>Fases </a:t>
+            </a:r>
+            <a:r>
+              <a:rPr lang="pt-BR" sz="1600" b="1" dirty="0">
+                <a:solidFill>
+                  <a:srgbClr val="E6005A"/>
+                </a:solidFill>
+                <a:latin typeface="Exo 2" panose="00000500000000000000" pitchFamily="50" charset="0"/>
+              </a:rPr>
+              <a:t>(utilizador)</a:t>
+            </a:r>
+          </a:p>
+        </p:txBody>
+      </p:sp>
+      <p:sp>
+        <p:nvSpPr>
+          <p:cNvPr id="19" name="Retângulo 18">
+            <a:extLst>
+              <a:ext uri="{FF2B5EF4-FFF2-40B4-BE49-F238E27FC236}">
+                <a16:creationId xmlns:a16="http://schemas.microsoft.com/office/drawing/2014/main" id="{13AE9B83-0B0F-4127-A281-0D3960239D61}"/>
+              </a:ext>
+            </a:extLst>
+          </p:cNvPr>
+          <p:cNvSpPr/>
+          <p:nvPr/>
+        </p:nvSpPr>
+        <p:spPr>
+          <a:xfrm>
+            <a:off x="248653" y="2163934"/>
+            <a:ext cx="2184972" cy="800219"/>
+          </a:xfrm>
+          <a:prstGeom prst="rect">
+            <a:avLst/>
+          </a:prstGeom>
+        </p:spPr>
+        <p:txBody>
+          <a:bodyPr wrap="square">
+            <a:spAutoFit/>
+          </a:bodyPr>
+          <a:lstStyle/>
+          <a:p>
+            <a:r>
+              <a:rPr lang="pt-BR" sz="2800" b="1" dirty="0">
+                <a:solidFill>
+                  <a:srgbClr val="E6005A"/>
+                </a:solidFill>
+                <a:latin typeface="Exo 2" panose="00000500000000000000" pitchFamily="50" charset="0"/>
+              </a:rPr>
+              <a:t>Faz</a:t>
+            </a:r>
+          </a:p>
+          <a:p>
+            <a:r>
+              <a:rPr lang="pt-BR" sz="1800" b="1" dirty="0">
+                <a:solidFill>
+                  <a:srgbClr val="E6005A"/>
+                </a:solidFill>
+                <a:latin typeface="Exo 2" panose="00000500000000000000" pitchFamily="50" charset="0"/>
+              </a:rPr>
+              <a:t>(ações do usuário) </a:t>
+            </a:r>
+          </a:p>
+        </p:txBody>
+      </p:sp>
+      <p:pic>
+        <p:nvPicPr>
+          <p:cNvPr id="20" name="Gráfico 19" descr="Rosto sorridente sem preenchimento ">
+            <a:extLst>
+              <a:ext uri="{FF2B5EF4-FFF2-40B4-BE49-F238E27FC236}">
+                <a16:creationId xmlns:a16="http://schemas.microsoft.com/office/drawing/2014/main" id="{1706975A-8EAD-40A1-B2BE-EDA9C2C307C6}"/>
+              </a:ext>
+            </a:extLst>
+          </p:cNvPr>
+          <p:cNvPicPr>
+            <a:picLocks noChangeAspect="1"/>
+          </p:cNvPicPr>
+          <p:nvPr/>
+        </p:nvPicPr>
+        <p:blipFill>
+          <a:blip r:embed="rId2">
+            <a:extLst>
+              <a:ext uri="{28A0092B-C50C-407E-A947-70E740481C1C}">
+                <a14:useLocalDpi xmlns:a14="http://schemas.microsoft.com/office/drawing/2010/main"/>
+              </a:ext>
+              <a:ext uri="{96DAC541-7B7A-43D3-8B79-37D633B846F1}">
+                <asvg:svgBlip xmlns:asvg="http://schemas.microsoft.com/office/drawing/2016/SVG/main" r:embed="rId3"/>
+              </a:ext>
+            </a:extLst>
+          </a:blip>
+          <a:stretch>
+            <a:fillRect/>
+          </a:stretch>
+        </p:blipFill>
+        <p:spPr>
+          <a:xfrm>
+            <a:off x="13666128" y="4111970"/>
+            <a:ext cx="914400" cy="914400"/>
+          </a:xfrm>
+          <a:prstGeom prst="rect">
+            <a:avLst/>
+          </a:prstGeom>
+        </p:spPr>
+      </p:pic>
+      <p:pic>
+        <p:nvPicPr>
+          <p:cNvPr id="21" name="Gráfico 20" descr="Rosto neutro sem preenchimento ">
+            <a:extLst>
+              <a:ext uri="{FF2B5EF4-FFF2-40B4-BE49-F238E27FC236}">
+                <a16:creationId xmlns:a16="http://schemas.microsoft.com/office/drawing/2014/main" id="{6FAAB793-58B7-4B8C-8AC7-76F1FA61F56D}"/>
+              </a:ext>
+            </a:extLst>
+          </p:cNvPr>
+          <p:cNvPicPr>
+            <a:picLocks noChangeAspect="1"/>
+          </p:cNvPicPr>
+          <p:nvPr/>
+        </p:nvPicPr>
+        <p:blipFill>
+          <a:blip r:embed="rId4">
+            <a:extLst>
+              <a:ext uri="{28A0092B-C50C-407E-A947-70E740481C1C}">
+                <a14:useLocalDpi xmlns:a14="http://schemas.microsoft.com/office/drawing/2010/main"/>
+              </a:ext>
+              <a:ext uri="{96DAC541-7B7A-43D3-8B79-37D633B846F1}">
+                <asvg:svgBlip xmlns:asvg="http://schemas.microsoft.com/office/drawing/2016/SVG/main" r:embed="rId5"/>
+              </a:ext>
+            </a:extLst>
+          </a:blip>
+          <a:stretch>
+            <a:fillRect/>
+          </a:stretch>
+        </p:blipFill>
+        <p:spPr>
+          <a:xfrm>
+            <a:off x="11121576" y="3295700"/>
+            <a:ext cx="914400" cy="914400"/>
+          </a:xfrm>
+          <a:prstGeom prst="rect">
+            <a:avLst/>
+          </a:prstGeom>
+        </p:spPr>
+      </p:pic>
+      <p:pic>
+        <p:nvPicPr>
+          <p:cNvPr id="22" name="Gráfico 21" descr="Rosto triste sem preenchimento ">
+            <a:extLst>
+              <a:ext uri="{FF2B5EF4-FFF2-40B4-BE49-F238E27FC236}">
+                <a16:creationId xmlns:a16="http://schemas.microsoft.com/office/drawing/2014/main" id="{55CDF0FB-173C-4CB0-B28A-E9AB34C2D0FF}"/>
+              </a:ext>
+            </a:extLst>
+          </p:cNvPr>
+          <p:cNvPicPr>
+            <a:picLocks noChangeAspect="1"/>
+          </p:cNvPicPr>
+          <p:nvPr/>
+        </p:nvPicPr>
+        <p:blipFill>
+          <a:blip r:embed="rId6">
+            <a:extLst>
+              <a:ext uri="{28A0092B-C50C-407E-A947-70E740481C1C}">
+                <a14:useLocalDpi xmlns:a14="http://schemas.microsoft.com/office/drawing/2010/main"/>
+              </a:ext>
+              <a:ext uri="{96DAC541-7B7A-43D3-8B79-37D633B846F1}">
+                <asvg:svgBlip xmlns:asvg="http://schemas.microsoft.com/office/drawing/2016/SVG/main" r:embed="rId7"/>
+              </a:ext>
+            </a:extLst>
+          </a:blip>
+          <a:stretch>
+            <a:fillRect/>
+          </a:stretch>
+        </p:blipFill>
+        <p:spPr>
+          <a:xfrm>
+            <a:off x="5706253" y="3228598"/>
+            <a:ext cx="914400" cy="914400"/>
+          </a:xfrm>
+          <a:prstGeom prst="rect">
+            <a:avLst/>
+          </a:prstGeom>
+        </p:spPr>
+      </p:pic>
+      <p:pic>
+        <p:nvPicPr>
+          <p:cNvPr id="23" name="Gráfico 22" descr="Rosto sorrindo sem preenchimento ">
+            <a:extLst>
+              <a:ext uri="{FF2B5EF4-FFF2-40B4-BE49-F238E27FC236}">
+                <a16:creationId xmlns:a16="http://schemas.microsoft.com/office/drawing/2014/main" id="{6DE827D7-BAAE-4623-8D72-65C252201968}"/>
+              </a:ext>
+            </a:extLst>
+          </p:cNvPr>
+          <p:cNvPicPr>
+            <a:picLocks noChangeAspect="1"/>
+          </p:cNvPicPr>
+          <p:nvPr/>
+        </p:nvPicPr>
+        <p:blipFill>
+          <a:blip r:embed="rId8">
+            <a:extLst>
+              <a:ext uri="{28A0092B-C50C-407E-A947-70E740481C1C}">
+                <a14:useLocalDpi xmlns:a14="http://schemas.microsoft.com/office/drawing/2010/main"/>
+              </a:ext>
+              <a:ext uri="{96DAC541-7B7A-43D3-8B79-37D633B846F1}">
+                <asvg:svgBlip xmlns:asvg="http://schemas.microsoft.com/office/drawing/2016/SVG/main" r:embed="rId9"/>
+              </a:ext>
+            </a:extLst>
+          </a:blip>
+          <a:stretch>
+            <a:fillRect/>
+          </a:stretch>
+        </p:blipFill>
+        <p:spPr>
+          <a:xfrm>
+            <a:off x="13666128" y="1138405"/>
+            <a:ext cx="914400" cy="914400"/>
+          </a:xfrm>
+          <a:prstGeom prst="rect">
+            <a:avLst/>
+          </a:prstGeom>
+        </p:spPr>
+      </p:pic>
+      <p:pic>
+        <p:nvPicPr>
+          <p:cNvPr id="24" name="Gráfico 23" descr="Rosto surpreso sem preenchimento ">
+            <a:extLst>
+              <a:ext uri="{FF2B5EF4-FFF2-40B4-BE49-F238E27FC236}">
+                <a16:creationId xmlns:a16="http://schemas.microsoft.com/office/drawing/2014/main" id="{FD90AE71-491A-4E75-B8F1-5B679CF4B27D}"/>
+              </a:ext>
+            </a:extLst>
+          </p:cNvPr>
+          <p:cNvPicPr>
+            <a:picLocks noChangeAspect="1"/>
+          </p:cNvPicPr>
+          <p:nvPr/>
+        </p:nvPicPr>
+        <p:blipFill>
+          <a:blip r:embed="rId10">
+            <a:extLst>
+              <a:ext uri="{28A0092B-C50C-407E-A947-70E740481C1C}">
+                <a14:useLocalDpi xmlns:a14="http://schemas.microsoft.com/office/drawing/2010/main"/>
+              </a:ext>
+              <a:ext uri="{96DAC541-7B7A-43D3-8B79-37D633B846F1}">
+                <asvg:svgBlip xmlns:asvg="http://schemas.microsoft.com/office/drawing/2016/SVG/main" r:embed="rId11"/>
+              </a:ext>
+            </a:extLst>
+          </a:blip>
+          <a:stretch>
+            <a:fillRect/>
+          </a:stretch>
+        </p:blipFill>
+        <p:spPr>
+          <a:xfrm>
+            <a:off x="13666128" y="6001167"/>
+            <a:ext cx="914400" cy="914400"/>
+          </a:xfrm>
+          <a:prstGeom prst="rect">
+            <a:avLst/>
+          </a:prstGeom>
+        </p:spPr>
+      </p:pic>
+      <p:pic>
+        <p:nvPicPr>
+          <p:cNvPr id="25" name="Gráfico 24" descr="Rosto sorridente sem preenchimento ">
+            <a:extLst>
+              <a:ext uri="{FF2B5EF4-FFF2-40B4-BE49-F238E27FC236}">
+                <a16:creationId xmlns:a16="http://schemas.microsoft.com/office/drawing/2014/main" id="{8527BE45-71B3-4E7C-B3DB-960383E84D09}"/>
+              </a:ext>
+            </a:extLst>
+          </p:cNvPr>
+          <p:cNvPicPr>
+            <a:picLocks noChangeAspect="1"/>
+          </p:cNvPicPr>
+          <p:nvPr/>
+        </p:nvPicPr>
+        <p:blipFill>
+          <a:blip r:embed="rId2">
+            <a:extLst>
+              <a:ext uri="{28A0092B-C50C-407E-A947-70E740481C1C}">
+                <a14:useLocalDpi xmlns:a14="http://schemas.microsoft.com/office/drawing/2010/main"/>
+              </a:ext>
+              <a:ext uri="{96DAC541-7B7A-43D3-8B79-37D633B846F1}">
+                <asvg:svgBlip xmlns:asvg="http://schemas.microsoft.com/office/drawing/2016/SVG/main" r:embed="rId3"/>
+              </a:ext>
+            </a:extLst>
+          </a:blip>
+          <a:stretch>
+            <a:fillRect/>
+          </a:stretch>
+        </p:blipFill>
+        <p:spPr>
+          <a:xfrm>
+            <a:off x="13666128" y="5118858"/>
+            <a:ext cx="914400" cy="914400"/>
+          </a:xfrm>
+          <a:prstGeom prst="rect">
+            <a:avLst/>
+          </a:prstGeom>
+        </p:spPr>
+      </p:pic>
+      <p:sp>
+        <p:nvSpPr>
+          <p:cNvPr id="26" name="Retângulo 25">
+            <a:extLst>
+              <a:ext uri="{FF2B5EF4-FFF2-40B4-BE49-F238E27FC236}">
+                <a16:creationId xmlns:a16="http://schemas.microsoft.com/office/drawing/2014/main" id="{1294E682-78FC-421E-B5BE-607A9AC42455}"/>
+              </a:ext>
+            </a:extLst>
+          </p:cNvPr>
+          <p:cNvSpPr/>
+          <p:nvPr/>
+        </p:nvSpPr>
+        <p:spPr>
+          <a:xfrm>
+            <a:off x="248653" y="3295700"/>
+            <a:ext cx="2382248" cy="830997"/>
+          </a:xfrm>
+          <a:prstGeom prst="rect">
+            <a:avLst/>
+          </a:prstGeom>
+        </p:spPr>
+        <p:txBody>
+          <a:bodyPr wrap="square">
+            <a:spAutoFit/>
+          </a:bodyPr>
+          <a:lstStyle/>
+          <a:p>
+            <a:r>
+              <a:rPr lang="pt-BR" sz="2800" b="1" dirty="0">
+                <a:solidFill>
+                  <a:srgbClr val="E6005A"/>
+                </a:solidFill>
+                <a:latin typeface="Exo 2" panose="00000500000000000000" pitchFamily="50" charset="0"/>
+              </a:rPr>
+              <a:t>Sente</a:t>
+            </a:r>
+          </a:p>
+          <a:p>
+            <a:r>
+              <a:rPr lang="pt-BR" sz="2000" b="1" dirty="0">
+                <a:solidFill>
+                  <a:srgbClr val="E6005A"/>
+                </a:solidFill>
+                <a:latin typeface="Exo 2" panose="00000500000000000000" pitchFamily="50" charset="0"/>
+              </a:rPr>
+              <a:t>(dores do usuário) </a:t>
+            </a:r>
+          </a:p>
+        </p:txBody>
+      </p:sp>
+      <p:cxnSp>
+        <p:nvCxnSpPr>
+          <p:cNvPr id="27" name="Conector reto 26">
+            <a:extLst>
+              <a:ext uri="{FF2B5EF4-FFF2-40B4-BE49-F238E27FC236}">
+                <a16:creationId xmlns:a16="http://schemas.microsoft.com/office/drawing/2014/main" id="{C7431F15-AA0D-4DBB-ABA3-B8202FA98F0C}"/>
+              </a:ext>
+            </a:extLst>
+          </p:cNvPr>
+          <p:cNvCxnSpPr/>
+          <p:nvPr/>
+        </p:nvCxnSpPr>
+        <p:spPr>
+          <a:xfrm>
+            <a:off x="248653" y="4320521"/>
+            <a:ext cx="12744000" cy="0"/>
+          </a:xfrm>
+          <a:prstGeom prst="line">
+            <a:avLst/>
+          </a:prstGeom>
+          <a:ln>
+            <a:solidFill>
+              <a:srgbClr val="32B9CD"/>
+            </a:solidFill>
+          </a:ln>
+        </p:spPr>
+        <p:style>
+          <a:lnRef idx="1">
+            <a:schemeClr val="accent1"/>
+          </a:lnRef>
+          <a:fillRef idx="0">
+            <a:schemeClr val="accent1"/>
+          </a:fillRef>
+          <a:effectRef idx="0">
+            <a:schemeClr val="accent1"/>
+          </a:effectRef>
+          <a:fontRef idx="minor">
+            <a:schemeClr val="tx1"/>
+          </a:fontRef>
+        </p:style>
+      </p:cxnSp>
+      <p:sp>
+        <p:nvSpPr>
+          <p:cNvPr id="28" name="Retângulo 27">
+            <a:extLst>
+              <a:ext uri="{FF2B5EF4-FFF2-40B4-BE49-F238E27FC236}">
+                <a16:creationId xmlns:a16="http://schemas.microsoft.com/office/drawing/2014/main" id="{C53130A1-A5F0-409E-8F51-46B1199676B3}"/>
+              </a:ext>
+            </a:extLst>
+          </p:cNvPr>
+          <p:cNvSpPr/>
+          <p:nvPr/>
+        </p:nvSpPr>
+        <p:spPr>
+          <a:xfrm>
+            <a:off x="2719132" y="4376377"/>
+            <a:ext cx="7160847" cy="1477328"/>
+          </a:xfrm>
+          <a:prstGeom prst="rect">
+            <a:avLst/>
+          </a:prstGeom>
+        </p:spPr>
+        <p:txBody>
+          <a:bodyPr wrap="square">
+            <a:spAutoFit/>
+          </a:bodyPr>
+          <a:lstStyle/>
+          <a:p>
+            <a:pPr marL="342900" indent="-342900">
+              <a:buFont typeface="Arial" panose="020B0604020202020204" pitchFamily="34" charset="0"/>
+              <a:buChar char="•"/>
+            </a:pPr>
+            <a:r>
+              <a:rPr lang="pt-BR" sz="1800" dirty="0">
+                <a:latin typeface="Exo 2" panose="00000500000000000000" pitchFamily="50" charset="0"/>
+              </a:rPr>
+              <a:t>Preciso encontrar algum lugar para marcar meu jogo </a:t>
+            </a:r>
+          </a:p>
+          <a:p>
+            <a:pPr marL="342900" indent="-342900">
+              <a:buFont typeface="Arial" panose="020B0604020202020204" pitchFamily="34" charset="0"/>
+              <a:buChar char="•"/>
+            </a:pPr>
+            <a:r>
+              <a:rPr lang="pt-BR" sz="1800" dirty="0">
+                <a:latin typeface="Exo 2" panose="00000500000000000000" pitchFamily="50" charset="0"/>
+              </a:rPr>
+              <a:t>Esse site não me da muitos detalhes para poder fazer uma reserva segura</a:t>
+            </a:r>
+          </a:p>
+          <a:p>
+            <a:pPr marL="342900" indent="-342900">
+              <a:buFont typeface="Arial" panose="020B0604020202020204" pitchFamily="34" charset="0"/>
+              <a:buChar char="•"/>
+            </a:pPr>
+            <a:r>
+              <a:rPr lang="pt-BR" sz="1800" dirty="0">
+                <a:latin typeface="Exo 2" panose="00000500000000000000" pitchFamily="50" charset="0"/>
+              </a:rPr>
+              <a:t>Vou fazer envio do contato espero que não demore</a:t>
+            </a:r>
+          </a:p>
+          <a:p>
+            <a:pPr marL="342900" indent="-342900">
+              <a:buFont typeface="Arial" panose="020B0604020202020204" pitchFamily="34" charset="0"/>
+              <a:buChar char="•"/>
+            </a:pPr>
+            <a:r>
+              <a:rPr lang="pt-BR" sz="1800" dirty="0">
+                <a:latin typeface="Exo 2" panose="00000500000000000000" pitchFamily="50" charset="0"/>
+              </a:rPr>
+              <a:t>Bom agora só me resta aguardar</a:t>
+            </a:r>
+          </a:p>
+        </p:txBody>
+      </p:sp>
+      <p:cxnSp>
+        <p:nvCxnSpPr>
+          <p:cNvPr id="29" name="Conector reto 28">
+            <a:extLst>
+              <a:ext uri="{FF2B5EF4-FFF2-40B4-BE49-F238E27FC236}">
+                <a16:creationId xmlns:a16="http://schemas.microsoft.com/office/drawing/2014/main" id="{67BBCA07-3174-441B-9D4B-1725B65874B2}"/>
+              </a:ext>
+            </a:extLst>
+          </p:cNvPr>
+          <p:cNvCxnSpPr/>
+          <p:nvPr/>
+        </p:nvCxnSpPr>
+        <p:spPr>
+          <a:xfrm>
+            <a:off x="248653" y="5796400"/>
+            <a:ext cx="12744000" cy="0"/>
+          </a:xfrm>
+          <a:prstGeom prst="line">
+            <a:avLst/>
+          </a:prstGeom>
+          <a:ln>
+            <a:solidFill>
+              <a:srgbClr val="32B9CD"/>
+            </a:solidFill>
+          </a:ln>
+        </p:spPr>
+        <p:style>
+          <a:lnRef idx="1">
+            <a:schemeClr val="accent1"/>
+          </a:lnRef>
+          <a:fillRef idx="0">
+            <a:schemeClr val="accent1"/>
+          </a:fillRef>
+          <a:effectRef idx="0">
+            <a:schemeClr val="accent1"/>
+          </a:effectRef>
+          <a:fontRef idx="minor">
+            <a:schemeClr val="tx1"/>
+          </a:fontRef>
+        </p:style>
+      </p:cxnSp>
+      <p:sp>
+        <p:nvSpPr>
+          <p:cNvPr id="30" name="Retângulo 29">
+            <a:extLst>
+              <a:ext uri="{FF2B5EF4-FFF2-40B4-BE49-F238E27FC236}">
+                <a16:creationId xmlns:a16="http://schemas.microsoft.com/office/drawing/2014/main" id="{78F5C4AB-EC36-485D-A766-46829BA666A4}"/>
+              </a:ext>
+            </a:extLst>
+          </p:cNvPr>
+          <p:cNvSpPr/>
+          <p:nvPr/>
+        </p:nvSpPr>
+        <p:spPr>
+          <a:xfrm>
+            <a:off x="248653" y="4610356"/>
+            <a:ext cx="2184972" cy="830997"/>
+          </a:xfrm>
+          <a:prstGeom prst="rect">
+            <a:avLst/>
+          </a:prstGeom>
+        </p:spPr>
+        <p:txBody>
+          <a:bodyPr wrap="square">
+            <a:spAutoFit/>
+          </a:bodyPr>
+          <a:lstStyle/>
+          <a:p>
+            <a:r>
+              <a:rPr lang="pt-BR" sz="2800" b="1" dirty="0">
+                <a:solidFill>
+                  <a:srgbClr val="E6005A"/>
+                </a:solidFill>
+                <a:latin typeface="Exo 2" panose="00000500000000000000" pitchFamily="50" charset="0"/>
+              </a:rPr>
+              <a:t>Pensa</a:t>
+            </a:r>
+          </a:p>
+          <a:p>
+            <a:r>
+              <a:rPr lang="pt-BR" sz="2000" b="1" dirty="0">
+                <a:solidFill>
+                  <a:srgbClr val="E6005A"/>
+                </a:solidFill>
+                <a:latin typeface="Exo 2" panose="00000500000000000000" pitchFamily="50" charset="0"/>
+              </a:rPr>
+              <a:t>(usuário) </a:t>
+            </a:r>
+          </a:p>
+        </p:txBody>
+      </p:sp>
+      <p:sp>
+        <p:nvSpPr>
+          <p:cNvPr id="31" name="Retângulo 30">
+            <a:extLst>
+              <a:ext uri="{FF2B5EF4-FFF2-40B4-BE49-F238E27FC236}">
+                <a16:creationId xmlns:a16="http://schemas.microsoft.com/office/drawing/2014/main" id="{23A179E6-5AF8-4137-A42F-D076A0416613}"/>
+              </a:ext>
+            </a:extLst>
+          </p:cNvPr>
+          <p:cNvSpPr/>
+          <p:nvPr/>
+        </p:nvSpPr>
+        <p:spPr>
+          <a:xfrm>
+            <a:off x="256675" y="5987678"/>
+            <a:ext cx="2184972" cy="800219"/>
+          </a:xfrm>
+          <a:prstGeom prst="rect">
+            <a:avLst/>
+          </a:prstGeom>
+        </p:spPr>
+        <p:txBody>
+          <a:bodyPr wrap="square">
+            <a:spAutoFit/>
+          </a:bodyPr>
+          <a:lstStyle/>
+          <a:p>
+            <a:r>
+              <a:rPr lang="pt-BR" sz="2800" b="1" dirty="0">
+                <a:solidFill>
+                  <a:srgbClr val="E6005A"/>
+                </a:solidFill>
+                <a:latin typeface="Exo 2" panose="00000500000000000000" pitchFamily="50" charset="0"/>
+              </a:rPr>
+              <a:t>Proposta</a:t>
+            </a:r>
+          </a:p>
+          <a:p>
+            <a:r>
+              <a:rPr lang="pt-BR" sz="1800" b="1" dirty="0">
+                <a:solidFill>
+                  <a:srgbClr val="E6005A"/>
+                </a:solidFill>
+                <a:latin typeface="Exo 2" panose="00000500000000000000" pitchFamily="50" charset="0"/>
+              </a:rPr>
+              <a:t>(mudanças) </a:t>
+            </a:r>
+          </a:p>
+        </p:txBody>
+      </p:sp>
+      <p:sp>
+        <p:nvSpPr>
+          <p:cNvPr id="32" name="Retângulo 31">
+            <a:extLst>
+              <a:ext uri="{FF2B5EF4-FFF2-40B4-BE49-F238E27FC236}">
+                <a16:creationId xmlns:a16="http://schemas.microsoft.com/office/drawing/2014/main" id="{20D1DDEE-A526-42BC-8F0A-06EA24712C13}"/>
+              </a:ext>
+            </a:extLst>
+          </p:cNvPr>
+          <p:cNvSpPr/>
+          <p:nvPr/>
+        </p:nvSpPr>
+        <p:spPr>
+          <a:xfrm>
+            <a:off x="2727154" y="5853705"/>
+            <a:ext cx="6614439" cy="1754326"/>
+          </a:xfrm>
+          <a:prstGeom prst="rect">
+            <a:avLst/>
+          </a:prstGeom>
+        </p:spPr>
+        <p:txBody>
+          <a:bodyPr wrap="square">
+            <a:spAutoFit/>
+          </a:bodyPr>
+          <a:lstStyle/>
+          <a:p>
+            <a:pPr marL="342900" indent="-342900">
+              <a:buFont typeface="Arial" panose="020B0604020202020204" pitchFamily="34" charset="0"/>
+              <a:buChar char="•"/>
+            </a:pPr>
+            <a:r>
+              <a:rPr lang="pt-BR" sz="1800" dirty="0">
+                <a:latin typeface="Exo 2" panose="00000500000000000000" pitchFamily="50" charset="0"/>
+              </a:rPr>
+              <a:t>Colocar no site algo que me leve para a marcação de jogos</a:t>
+            </a:r>
+          </a:p>
+          <a:p>
+            <a:pPr marL="342900" indent="-342900">
+              <a:buFont typeface="Arial" panose="020B0604020202020204" pitchFamily="34" charset="0"/>
+              <a:buChar char="•"/>
+            </a:pPr>
+            <a:r>
+              <a:rPr lang="pt-BR" sz="1800" dirty="0">
+                <a:latin typeface="Exo 2" panose="00000500000000000000" pitchFamily="50" charset="0"/>
+              </a:rPr>
+              <a:t>Criar uma opção onde o próprio cliente possa visualizar onde fazer sua própria reserva</a:t>
+            </a:r>
+          </a:p>
+          <a:p>
+            <a:pPr marL="342900" indent="-342900">
+              <a:buFont typeface="Arial" panose="020B0604020202020204" pitchFamily="34" charset="0"/>
+              <a:buChar char="•"/>
+            </a:pPr>
+            <a:r>
+              <a:rPr lang="pt-BR" sz="1800" dirty="0">
+                <a:latin typeface="Exo 2" panose="00000500000000000000" pitchFamily="50" charset="0"/>
+              </a:rPr>
+              <a:t>Mostrar para o cliente que ele pode ter uma outra opção para o aluguel de sua reserva</a:t>
+            </a:r>
+          </a:p>
+          <a:p>
+            <a:pPr marL="342900" indent="-342900">
+              <a:buFont typeface="Arial" panose="020B0604020202020204" pitchFamily="34" charset="0"/>
+              <a:buChar char="•"/>
+            </a:pPr>
+            <a:r>
+              <a:rPr lang="pt-BR" sz="1800" dirty="0">
+                <a:latin typeface="Exo 2" panose="00000500000000000000" pitchFamily="50" charset="0"/>
+              </a:rPr>
+              <a:t>Mostrar a estimativa que entraríamos em contato com o cliente</a:t>
+            </a:r>
+          </a:p>
+        </p:txBody>
+      </p:sp>
+      <p:pic>
+        <p:nvPicPr>
+          <p:cNvPr id="33" name="Gráfico 32" descr="Rosto neutro sem preenchimento ">
+            <a:extLst>
+              <a:ext uri="{FF2B5EF4-FFF2-40B4-BE49-F238E27FC236}">
+                <a16:creationId xmlns:a16="http://schemas.microsoft.com/office/drawing/2014/main" id="{9157FBD9-6DE9-4EB8-AC4B-28BB0AF6FE7A}"/>
+              </a:ext>
+            </a:extLst>
+          </p:cNvPr>
+          <p:cNvPicPr>
+            <a:picLocks noChangeAspect="1"/>
+          </p:cNvPicPr>
+          <p:nvPr/>
+        </p:nvPicPr>
+        <p:blipFill>
+          <a:blip r:embed="rId4">
+            <a:extLst>
+              <a:ext uri="{28A0092B-C50C-407E-A947-70E740481C1C}">
+                <a14:useLocalDpi xmlns:a14="http://schemas.microsoft.com/office/drawing/2010/main"/>
+              </a:ext>
+              <a:ext uri="{96DAC541-7B7A-43D3-8B79-37D633B846F1}">
+                <asvg:svgBlip xmlns:asvg="http://schemas.microsoft.com/office/drawing/2016/SVG/main" r:embed="rId5"/>
+              </a:ext>
+            </a:extLst>
+          </a:blip>
+          <a:stretch>
+            <a:fillRect/>
+          </a:stretch>
+        </p:blipFill>
+        <p:spPr>
+          <a:xfrm>
+            <a:off x="2847176" y="3305857"/>
+            <a:ext cx="914400" cy="914400"/>
+          </a:xfrm>
+          <a:prstGeom prst="rect">
+            <a:avLst/>
+          </a:prstGeom>
+        </p:spPr>
+      </p:pic>
+      <p:sp>
+        <p:nvSpPr>
+          <p:cNvPr id="34" name="CaixaDeTexto 33">
+            <a:extLst>
+              <a:ext uri="{FF2B5EF4-FFF2-40B4-BE49-F238E27FC236}">
+                <a16:creationId xmlns:a16="http://schemas.microsoft.com/office/drawing/2014/main" id="{E943B28C-9A7C-4FC5-94BD-7161C8A70FF3}"/>
+              </a:ext>
+            </a:extLst>
+          </p:cNvPr>
+          <p:cNvSpPr txBox="1"/>
+          <p:nvPr/>
+        </p:nvSpPr>
+        <p:spPr>
+          <a:xfrm>
+            <a:off x="5057341" y="2155463"/>
+            <a:ext cx="2655287" cy="646331"/>
+          </a:xfrm>
+          <a:prstGeom prst="rect">
+            <a:avLst/>
+          </a:prstGeom>
+          <a:noFill/>
+        </p:spPr>
+        <p:txBody>
+          <a:bodyPr wrap="square">
+            <a:spAutoFit/>
+          </a:bodyPr>
+          <a:lstStyle/>
+          <a:p>
+            <a:pPr marL="342900" indent="-342900">
+              <a:buFont typeface="Arial" panose="020B0604020202020204" pitchFamily="34" charset="0"/>
+              <a:buChar char="•"/>
+            </a:pPr>
+            <a:r>
+              <a:rPr lang="pt-BR" sz="1800" dirty="0">
+                <a:latin typeface="Exo 2" panose="00000500000000000000" pitchFamily="50" charset="0"/>
+              </a:rPr>
+              <a:t>Vai reservar a quadra para o seu evento</a:t>
+            </a:r>
+          </a:p>
+        </p:txBody>
+      </p:sp>
+      <p:sp>
+        <p:nvSpPr>
+          <p:cNvPr id="35" name="CaixaDeTexto 34">
+            <a:extLst>
+              <a:ext uri="{FF2B5EF4-FFF2-40B4-BE49-F238E27FC236}">
+                <a16:creationId xmlns:a16="http://schemas.microsoft.com/office/drawing/2014/main" id="{F19CBAEA-7C1E-49E1-B0E9-56D7FBFD7570}"/>
+              </a:ext>
+            </a:extLst>
+          </p:cNvPr>
+          <p:cNvSpPr txBox="1"/>
+          <p:nvPr/>
+        </p:nvSpPr>
+        <p:spPr>
+          <a:xfrm>
+            <a:off x="7712628" y="2246660"/>
+            <a:ext cx="2518611" cy="923330"/>
+          </a:xfrm>
+          <a:prstGeom prst="rect">
+            <a:avLst/>
+          </a:prstGeom>
+          <a:noFill/>
+        </p:spPr>
+        <p:txBody>
+          <a:bodyPr wrap="square">
+            <a:spAutoFit/>
+          </a:bodyPr>
+          <a:lstStyle/>
+          <a:p>
+            <a:pPr marL="342900" indent="-342900">
+              <a:buFont typeface="Arial" panose="020B0604020202020204" pitchFamily="34" charset="0"/>
+              <a:buChar char="•"/>
+            </a:pPr>
+            <a:r>
+              <a:rPr lang="pt-BR" sz="1800" dirty="0">
+                <a:latin typeface="Exo 2" panose="00000500000000000000" pitchFamily="50" charset="0"/>
+              </a:rPr>
+              <a:t>Faz o envio do contato para a reserva</a:t>
+            </a:r>
+          </a:p>
+        </p:txBody>
+      </p:sp>
+      <p:pic>
+        <p:nvPicPr>
+          <p:cNvPr id="36" name="Gráfico 35" descr="Rosto triste sem preenchimento ">
+            <a:extLst>
+              <a:ext uri="{FF2B5EF4-FFF2-40B4-BE49-F238E27FC236}">
+                <a16:creationId xmlns:a16="http://schemas.microsoft.com/office/drawing/2014/main" id="{76E6347F-865F-4B51-B935-552870426099}"/>
+              </a:ext>
+            </a:extLst>
+          </p:cNvPr>
+          <p:cNvPicPr>
+            <a:picLocks noChangeAspect="1"/>
+          </p:cNvPicPr>
+          <p:nvPr/>
+        </p:nvPicPr>
+        <p:blipFill>
+          <a:blip r:embed="rId6">
+            <a:extLst>
+              <a:ext uri="{28A0092B-C50C-407E-A947-70E740481C1C}">
+                <a14:useLocalDpi xmlns:a14="http://schemas.microsoft.com/office/drawing/2010/main"/>
+              </a:ext>
+              <a:ext uri="{96DAC541-7B7A-43D3-8B79-37D633B846F1}">
+                <asvg:svgBlip xmlns:asvg="http://schemas.microsoft.com/office/drawing/2016/SVG/main" r:embed="rId7"/>
+              </a:ext>
+            </a:extLst>
+          </a:blip>
+          <a:stretch>
+            <a:fillRect/>
+          </a:stretch>
+        </p:blipFill>
+        <p:spPr>
+          <a:xfrm>
+            <a:off x="8256652" y="3261204"/>
+            <a:ext cx="914400" cy="914400"/>
+          </a:xfrm>
+          <a:prstGeom prst="rect">
+            <a:avLst/>
+          </a:prstGeom>
+        </p:spPr>
+      </p:pic>
+      <p:sp>
+        <p:nvSpPr>
+          <p:cNvPr id="37" name="CaixaDeTexto 36">
+            <a:extLst>
+              <a:ext uri="{FF2B5EF4-FFF2-40B4-BE49-F238E27FC236}">
+                <a16:creationId xmlns:a16="http://schemas.microsoft.com/office/drawing/2014/main" id="{2B246CF5-D27A-4512-8E34-99C0DBA16D49}"/>
+              </a:ext>
+            </a:extLst>
+          </p:cNvPr>
+          <p:cNvSpPr txBox="1"/>
+          <p:nvPr/>
+        </p:nvSpPr>
+        <p:spPr>
+          <a:xfrm>
+            <a:off x="10231239" y="2290810"/>
+            <a:ext cx="3152315" cy="378229"/>
+          </a:xfrm>
+          <a:prstGeom prst="rect">
+            <a:avLst/>
+          </a:prstGeom>
+          <a:noFill/>
+        </p:spPr>
+        <p:txBody>
+          <a:bodyPr wrap="square">
+            <a:spAutoFit/>
+          </a:bodyPr>
+          <a:lstStyle/>
+          <a:p>
+            <a:pPr marL="342900" indent="-342900">
+              <a:buFont typeface="Arial" panose="020B0604020202020204" pitchFamily="34" charset="0"/>
+              <a:buChar char="•"/>
+            </a:pPr>
+            <a:r>
+              <a:rPr lang="pt-BR" sz="1800" dirty="0">
+                <a:latin typeface="Exo 2" panose="00000500000000000000" pitchFamily="50" charset="0"/>
+              </a:rPr>
+              <a:t>Aguarda a conclusão </a:t>
+            </a:r>
+          </a:p>
+        </p:txBody>
+      </p:sp>
+    </p:spTree>
+    <p:extLst>
+      <p:ext uri="{BB962C8B-B14F-4D97-AF65-F5344CB8AC3E}">
+        <p14:creationId xmlns:p14="http://schemas.microsoft.com/office/powerpoint/2010/main" val="1571467372"/>
       </p:ext>
     </p:extLst>
   </p:cSld>
@@ -11805,18 +15566,18 @@
 </file>
 
 <file path=customXml/item2.xml><?xml version="1.0" encoding="utf-8"?>
+<p:properties xmlns:p="http://schemas.microsoft.com/office/2006/metadata/properties" xmlns:xsi="http://www.w3.org/2001/XMLSchema-instance" xmlns:pc="http://schemas.microsoft.com/office/infopath/2007/PartnerControls">
+  <documentManagement/>
+</p:properties>
+</file>
+
+<file path=customXml/item3.xml><?xml version="1.0" encoding="utf-8"?>
 <?mso-contentType ?>
 <FormTemplates xmlns="http://schemas.microsoft.com/sharepoint/v3/contenttype/forms">
   <Display>DocumentLibraryForm</Display>
   <Edit>DocumentLibraryForm</Edit>
   <New>DocumentLibraryForm</New>
 </FormTemplates>
-</file>
-
-<file path=customXml/item3.xml><?xml version="1.0" encoding="utf-8"?>
-<p:properties xmlns:p="http://schemas.microsoft.com/office/2006/metadata/properties" xmlns:xsi="http://www.w3.org/2001/XMLSchema-instance" xmlns:pc="http://schemas.microsoft.com/office/infopath/2007/PartnerControls">
-  <documentManagement/>
-</p:properties>
 </file>
 
 <file path=customXml/itemProps1.xml><?xml version="1.0" encoding="utf-8"?>
@@ -11839,14 +15600,6 @@
 </file>
 
 <file path=customXml/itemProps2.xml><?xml version="1.0" encoding="utf-8"?>
-<ds:datastoreItem xmlns:ds="http://schemas.openxmlformats.org/officeDocument/2006/customXml" ds:itemID="{C5C26249-539D-4496-936B-3CD83A43905E}">
-  <ds:schemaRefs>
-    <ds:schemaRef ds:uri="http://schemas.microsoft.com/sharepoint/v3/contenttype/forms"/>
-  </ds:schemaRefs>
-</ds:datastoreItem>
-</file>
-
-<file path=customXml/itemProps3.xml><?xml version="1.0" encoding="utf-8"?>
 <ds:datastoreItem xmlns:ds="http://schemas.openxmlformats.org/officeDocument/2006/customXml" ds:itemID="{08323129-B204-40D5-AFF8-9C9A9BF3922E}">
   <ds:schemaRefs>
     <ds:schemaRef ds:uri="http://purl.org/dc/terms/"/>
@@ -11861,4 +15614,12 @@
     <ds:schemaRef ds:uri="http://www.w3.org/XML/1998/namespace"/>
   </ds:schemaRefs>
 </ds:datastoreItem>
+</file>
+
+<file path=customXml/itemProps3.xml><?xml version="1.0" encoding="utf-8"?>
+<ds:datastoreItem xmlns:ds="http://schemas.openxmlformats.org/officeDocument/2006/customXml" ds:itemID="{C5C26249-539D-4496-936B-3CD83A43905E}">
+  <ds:schemaRefs>
+    <ds:schemaRef ds:uri="http://schemas.microsoft.com/sharepoint/v3/contenttype/forms"/>
+  </ds:schemaRefs>
+</ds:datastoreItem>
 </file>
</xml_diff>